<commit_message>
add description about dependencies projects #1982
</commit_message>
<xml_diff>
--- a/source/Overview/images_FrameworkStack/materialFrameworkStack.pptx
+++ b/source/Overview/images_FrameworkStack/materialFrameworkStack.pptx
@@ -10,7 +10,7 @@
   <p:sldIdLst>
     <p:sldId id="272" r:id="rId2"/>
     <p:sldId id="337" r:id="rId3"/>
-    <p:sldId id="338" r:id="rId4"/>
+    <p:sldId id="339" r:id="rId4"/>
   </p:sldIdLst>
   <p:sldSz cx="9144000" cy="6858000" type="screen4x3"/>
   <p:notesSz cx="6858000" cy="9144000"/>
@@ -116,13 +116,13 @@
           <p14:sldIdLst>
             <p14:sldId id="272"/>
             <p14:sldId id="337"/>
-            <p14:sldId id="338"/>
+            <p14:sldId id="339"/>
           </p14:sldIdLst>
         </p14:section>
       </p14:sectionLst>
     </p:ext>
     <p:ext uri="{EFAFB233-063F-42B5-8137-9DF3F51BA10A}">
-      <p15:sldGuideLst xmlns:p15="http://schemas.microsoft.com/office/powerpoint/2012/main">
+      <p15:sldGuideLst xmlns="" xmlns:p15="http://schemas.microsoft.com/office/powerpoint/2012/main">
         <p15:guide id="1" orient="horz" pos="2160">
           <p15:clr>
             <a:srgbClr val="A4A3A4"/>
@@ -221,7 +221,7 @@
           <a:p>
             <a:fld id="{3BB47352-BF5A-4CD2-B029-996118CD8E01}" type="datetimeFigureOut">
               <a:rPr kumimoji="1" lang="ja-JP" altLang="en-US" smtClean="0"/>
-              <a:t>2016/2/5</a:t>
+              <a:t>2016/8/1</a:t>
             </a:fld>
             <a:endParaRPr kumimoji="1" lang="ja-JP" altLang="en-US"/>
           </a:p>
@@ -954,7 +954,7 @@
           <a:p>
             <a:fld id="{7B9B12EC-6AA0-374B-A2D3-850081A07A26}" type="datetimeFigureOut">
               <a:rPr kumimoji="1" lang="ja-JP" altLang="en-US" smtClean="0"/>
-              <a:t>2016/2/5</a:t>
+              <a:t>2016/8/1</a:t>
             </a:fld>
             <a:endParaRPr kumimoji="1" lang="ja-JP" altLang="en-US"/>
           </a:p>
@@ -1156,7 +1156,7 @@
           <a:p>
             <a:fld id="{7B9B12EC-6AA0-374B-A2D3-850081A07A26}" type="datetimeFigureOut">
               <a:rPr kumimoji="1" lang="ja-JP" altLang="en-US" smtClean="0"/>
-              <a:t>2016/2/5</a:t>
+              <a:t>2016/8/1</a:t>
             </a:fld>
             <a:endParaRPr kumimoji="1" lang="ja-JP" altLang="en-US"/>
           </a:p>
@@ -1368,7 +1368,7 @@
           <a:p>
             <a:fld id="{7B9B12EC-6AA0-374B-A2D3-850081A07A26}" type="datetimeFigureOut">
               <a:rPr kumimoji="1" lang="ja-JP" altLang="en-US" smtClean="0"/>
-              <a:t>2016/2/5</a:t>
+              <a:t>2016/8/1</a:t>
             </a:fld>
             <a:endParaRPr kumimoji="1" lang="ja-JP" altLang="en-US"/>
           </a:p>
@@ -1570,7 +1570,7 @@
           <a:p>
             <a:fld id="{7B9B12EC-6AA0-374B-A2D3-850081A07A26}" type="datetimeFigureOut">
               <a:rPr kumimoji="1" lang="ja-JP" altLang="en-US" smtClean="0"/>
-              <a:t>2016/2/5</a:t>
+              <a:t>2016/8/1</a:t>
             </a:fld>
             <a:endParaRPr kumimoji="1" lang="ja-JP" altLang="en-US"/>
           </a:p>
@@ -1816,7 +1816,7 @@
           <a:p>
             <a:fld id="{7B9B12EC-6AA0-374B-A2D3-850081A07A26}" type="datetimeFigureOut">
               <a:rPr kumimoji="1" lang="ja-JP" altLang="en-US" smtClean="0"/>
-              <a:t>2016/2/5</a:t>
+              <a:t>2016/8/1</a:t>
             </a:fld>
             <a:endParaRPr kumimoji="1" lang="ja-JP" altLang="en-US"/>
           </a:p>
@@ -2168,7 +2168,7 @@
           <a:p>
             <a:fld id="{7B9B12EC-6AA0-374B-A2D3-850081A07A26}" type="datetimeFigureOut">
               <a:rPr kumimoji="1" lang="ja-JP" altLang="en-US" smtClean="0"/>
-              <a:t>2016/2/5</a:t>
+              <a:t>2016/8/1</a:t>
             </a:fld>
             <a:endParaRPr kumimoji="1" lang="ja-JP" altLang="en-US"/>
           </a:p>
@@ -2654,7 +2654,7 @@
           <a:p>
             <a:fld id="{7B9B12EC-6AA0-374B-A2D3-850081A07A26}" type="datetimeFigureOut">
               <a:rPr kumimoji="1" lang="ja-JP" altLang="en-US" smtClean="0"/>
-              <a:t>2016/2/5</a:t>
+              <a:t>2016/8/1</a:t>
             </a:fld>
             <a:endParaRPr kumimoji="1" lang="ja-JP" altLang="en-US"/>
           </a:p>
@@ -2772,7 +2772,7 @@
           <a:p>
             <a:fld id="{7B9B12EC-6AA0-374B-A2D3-850081A07A26}" type="datetimeFigureOut">
               <a:rPr kumimoji="1" lang="ja-JP" altLang="en-US" smtClean="0"/>
-              <a:t>2016/2/5</a:t>
+              <a:t>2016/8/1</a:t>
             </a:fld>
             <a:endParaRPr kumimoji="1" lang="ja-JP" altLang="en-US"/>
           </a:p>
@@ -2867,7 +2867,7 @@
           <a:p>
             <a:fld id="{7B9B12EC-6AA0-374B-A2D3-850081A07A26}" type="datetimeFigureOut">
               <a:rPr kumimoji="1" lang="ja-JP" altLang="en-US" smtClean="0"/>
-              <a:t>2016/2/5</a:t>
+              <a:t>2016/8/1</a:t>
             </a:fld>
             <a:endParaRPr kumimoji="1" lang="ja-JP" altLang="en-US"/>
           </a:p>
@@ -3176,7 +3176,7 @@
           <a:p>
             <a:fld id="{7B9B12EC-6AA0-374B-A2D3-850081A07A26}" type="datetimeFigureOut">
               <a:rPr kumimoji="1" lang="ja-JP" altLang="en-US" smtClean="0"/>
-              <a:t>2016/2/5</a:t>
+              <a:t>2016/8/1</a:t>
             </a:fld>
             <a:endParaRPr kumimoji="1" lang="ja-JP" altLang="en-US"/>
           </a:p>
@@ -3429,7 +3429,7 @@
           <a:p>
             <a:fld id="{7B9B12EC-6AA0-374B-A2D3-850081A07A26}" type="datetimeFigureOut">
               <a:rPr kumimoji="1" lang="ja-JP" altLang="en-US" smtClean="0"/>
-              <a:t>2016/2/5</a:t>
+              <a:t>2016/8/1</a:t>
             </a:fld>
             <a:endParaRPr kumimoji="1" lang="ja-JP" altLang="en-US"/>
           </a:p>
@@ -3674,7 +3674,7 @@
           <a:p>
             <a:fld id="{7B9B12EC-6AA0-374B-A2D3-850081A07A26}" type="datetimeFigureOut">
               <a:rPr kumimoji="1" lang="ja-JP" altLang="en-US" smtClean="0"/>
-              <a:t>2016/2/5</a:t>
+              <a:t>2016/8/1</a:t>
             </a:fld>
             <a:endParaRPr kumimoji="1" lang="ja-JP" altLang="en-US"/>
           </a:p>
@@ -6769,8 +6769,78 @@
         </p:nvSpPr>
         <p:spPr>
           <a:xfrm>
-            <a:off x="3114778" y="4425030"/>
+            <a:off x="5379438" y="4415769"/>
             <a:ext cx="3387338" cy="368242"/>
+          </a:xfrm>
+          <a:prstGeom prst="roundRect">
+            <a:avLst/>
+          </a:prstGeom>
+          <a:gradFill>
+            <a:gsLst>
+              <a:gs pos="0">
+                <a:schemeClr val="bg1">
+                  <a:lumMod val="75000"/>
+                </a:schemeClr>
+              </a:gs>
+              <a:gs pos="100000">
+                <a:schemeClr val="bg1">
+                  <a:lumMod val="95000"/>
+                </a:schemeClr>
+              </a:gs>
+            </a:gsLst>
+          </a:gradFill>
+        </p:spPr>
+        <p:style>
+          <a:lnRef idx="1">
+            <a:schemeClr val="dk1"/>
+          </a:lnRef>
+          <a:fillRef idx="3">
+            <a:schemeClr val="dk1"/>
+          </a:fillRef>
+          <a:effectRef idx="2">
+            <a:schemeClr val="dk1"/>
+          </a:effectRef>
+          <a:fontRef idx="minor">
+            <a:schemeClr val="lt1"/>
+          </a:fontRef>
+        </p:style>
+        <p:txBody>
+          <a:bodyPr rtlCol="0" anchor="ctr"/>
+          <a:lstStyle/>
+          <a:p>
+            <a:pPr algn="ctr"/>
+            <a:r>
+              <a:rPr lang="en-US" altLang="ja-JP" sz="1600" dirty="0" smtClean="0">
+                <a:solidFill>
+                  <a:schemeClr val="tx1">
+                    <a:lumMod val="75000"/>
+                    <a:lumOff val="25000"/>
+                  </a:schemeClr>
+                </a:solidFill>
+              </a:rPr>
+              <a:t>security-core-dependencies</a:t>
+            </a:r>
+            <a:endParaRPr kumimoji="1" lang="en-US" altLang="ja-JP" sz="1600" dirty="0" smtClean="0">
+              <a:solidFill>
+                <a:schemeClr val="tx1">
+                  <a:lumMod val="75000"/>
+                  <a:lumOff val="25000"/>
+                </a:schemeClr>
+              </a:solidFill>
+            </a:endParaRPr>
+          </a:p>
+        </p:txBody>
+      </p:sp>
+      <p:sp>
+        <p:nvSpPr>
+          <p:cNvPr id="47" name="角丸四角形 46"/>
+          <p:cNvSpPr/>
+          <p:nvPr/>
+        </p:nvSpPr>
+        <p:spPr>
+          <a:xfrm>
+            <a:off x="391508" y="3741255"/>
+            <a:ext cx="3363924" cy="368242"/>
           </a:xfrm>
           <a:prstGeom prst="roundRect">
             <a:avLst/>
@@ -6829,7 +6899,7 @@
                   </a:schemeClr>
                 </a:solidFill>
               </a:rPr>
-              <a:t>ecurity-core</a:t>
+              <a:t>ecurity-web</a:t>
             </a:r>
             <a:endParaRPr kumimoji="1" lang="en-US" altLang="ja-JP" sz="1600" dirty="0" smtClean="0">
               <a:solidFill>
@@ -6844,94 +6914,13 @@
       </p:sp>
       <p:sp>
         <p:nvSpPr>
-          <p:cNvPr id="47" name="角丸四角形 46"/>
-          <p:cNvSpPr/>
-          <p:nvPr/>
-        </p:nvSpPr>
-        <p:spPr>
-          <a:xfrm>
-            <a:off x="3118347" y="3778545"/>
-            <a:ext cx="3363924" cy="368242"/>
-          </a:xfrm>
-          <a:prstGeom prst="roundRect">
-            <a:avLst/>
-          </a:prstGeom>
-          <a:gradFill>
-            <a:gsLst>
-              <a:gs pos="0">
-                <a:schemeClr val="bg1">
-                  <a:lumMod val="75000"/>
-                </a:schemeClr>
-              </a:gs>
-              <a:gs pos="100000">
-                <a:schemeClr val="bg1">
-                  <a:lumMod val="95000"/>
-                </a:schemeClr>
-              </a:gs>
-            </a:gsLst>
-          </a:gradFill>
-        </p:spPr>
-        <p:style>
-          <a:lnRef idx="1">
-            <a:schemeClr val="dk1"/>
-          </a:lnRef>
-          <a:fillRef idx="3">
-            <a:schemeClr val="dk1"/>
-          </a:fillRef>
-          <a:effectRef idx="2">
-            <a:schemeClr val="dk1"/>
-          </a:effectRef>
-          <a:fontRef idx="minor">
-            <a:schemeClr val="lt1"/>
-          </a:fontRef>
-        </p:style>
-        <p:txBody>
-          <a:bodyPr rtlCol="0" anchor="ctr"/>
-          <a:lstStyle/>
-          <a:p>
-            <a:pPr algn="ctr"/>
-            <a:r>
-              <a:rPr lang="en-US" altLang="ja-JP" sz="1600" dirty="0">
-                <a:solidFill>
-                  <a:schemeClr val="tx1">
-                    <a:lumMod val="75000"/>
-                    <a:lumOff val="25000"/>
-                  </a:schemeClr>
-                </a:solidFill>
-              </a:rPr>
-              <a:t>s</a:t>
-            </a:r>
-            <a:r>
-              <a:rPr lang="en-US" altLang="ja-JP" sz="1600" dirty="0" smtClean="0">
-                <a:solidFill>
-                  <a:schemeClr val="tx1">
-                    <a:lumMod val="75000"/>
-                    <a:lumOff val="25000"/>
-                  </a:schemeClr>
-                </a:solidFill>
-              </a:rPr>
-              <a:t>ecurity-web</a:t>
-            </a:r>
-            <a:endParaRPr kumimoji="1" lang="en-US" altLang="ja-JP" sz="1600" dirty="0" smtClean="0">
-              <a:solidFill>
-                <a:schemeClr val="tx1">
-                  <a:lumMod val="75000"/>
-                  <a:lumOff val="25000"/>
-                </a:schemeClr>
-              </a:solidFill>
-            </a:endParaRPr>
-          </a:p>
-        </p:txBody>
-      </p:sp>
-      <p:sp>
-        <p:nvSpPr>
           <p:cNvPr id="48" name="角丸四角形 47"/>
           <p:cNvSpPr/>
           <p:nvPr/>
         </p:nvSpPr>
         <p:spPr>
           <a:xfrm>
-            <a:off x="3148113" y="6364485"/>
+            <a:off x="5412773" y="6355224"/>
             <a:ext cx="3363925" cy="368242"/>
           </a:xfrm>
           <a:prstGeom prst="roundRect">
@@ -7012,7 +7001,7 @@
         </p:nvSpPr>
         <p:spPr>
           <a:xfrm>
-            <a:off x="3158284" y="7010967"/>
+            <a:off x="5422944" y="7001706"/>
             <a:ext cx="3353754" cy="368242"/>
           </a:xfrm>
           <a:prstGeom prst="roundRect">
@@ -7082,7 +7071,7 @@
         </p:nvSpPr>
         <p:spPr>
           <a:xfrm>
-            <a:off x="3124700" y="5071515"/>
+            <a:off x="5389360" y="5062254"/>
             <a:ext cx="3387338" cy="368242"/>
           </a:xfrm>
           <a:prstGeom prst="roundRect">
@@ -7131,7 +7120,7 @@
                   </a:schemeClr>
                 </a:solidFill>
               </a:rPr>
-              <a:t>mybatis3</a:t>
+              <a:t>Mybatis3-dependencies</a:t>
             </a:r>
             <a:endParaRPr kumimoji="1" lang="en-US" altLang="ja-JP" sz="1600" dirty="0" smtClean="0">
               <a:solidFill>
@@ -7152,7 +7141,7 @@
         </p:nvSpPr>
         <p:spPr>
           <a:xfrm>
-            <a:off x="3138191" y="5718000"/>
+            <a:off x="5402851" y="5708739"/>
             <a:ext cx="3387338" cy="368242"/>
           </a:xfrm>
           <a:prstGeom prst="roundRect">
@@ -7201,16 +7190,19 @@
                   </a:schemeClr>
                 </a:solidFill>
               </a:rPr>
-              <a:t>jpa</a:t>
-            </a:r>
-            <a:endParaRPr kumimoji="1" lang="en-US" altLang="ja-JP" sz="1600" dirty="0" smtClean="0">
-              <a:solidFill>
-                <a:schemeClr val="tx1">
-                  <a:lumMod val="75000"/>
-                  <a:lumOff val="25000"/>
-                </a:schemeClr>
-              </a:solidFill>
-            </a:endParaRPr>
+              <a:t>Jpa</a:t>
+            </a:r>
+            <a:r>
+              <a:rPr kumimoji="1" lang="en-US" altLang="ja-JP" sz="1600" dirty="0" smtClean="0">
+                <a:solidFill>
+                  <a:schemeClr val="tx1">
+                    <a:lumMod val="75000"/>
+                    <a:lumOff val="25000"/>
+                  </a:schemeClr>
+                </a:solidFill>
+              </a:rPr>
+              <a:t>-dependencies</a:t>
+            </a:r>
           </a:p>
         </p:txBody>
       </p:sp>
@@ -7222,7 +7214,7 @@
         </p:nvSpPr>
         <p:spPr>
           <a:xfrm>
-            <a:off x="3104855" y="1839090"/>
+            <a:off x="378016" y="1801800"/>
             <a:ext cx="3387338" cy="368242"/>
           </a:xfrm>
           <a:prstGeom prst="roundRect">
@@ -7292,7 +7284,7 @@
         </p:nvSpPr>
         <p:spPr>
           <a:xfrm>
-            <a:off x="3114778" y="2485575"/>
+            <a:off x="387939" y="2448285"/>
             <a:ext cx="3377415" cy="368242"/>
           </a:xfrm>
           <a:prstGeom prst="roundRect">
@@ -7354,7 +7346,7 @@
         </p:nvSpPr>
         <p:spPr>
           <a:xfrm>
-            <a:off x="3104856" y="1192605"/>
+            <a:off x="378017" y="1155315"/>
             <a:ext cx="3387338" cy="368242"/>
           </a:xfrm>
           <a:prstGeom prst="roundRect">
@@ -7416,112 +7408,6 @@
           </a:p>
         </p:txBody>
       </p:sp>
-      <p:sp>
-        <p:nvSpPr>
-          <p:cNvPr id="56" name="角丸四角形 55"/>
-          <p:cNvSpPr/>
-          <p:nvPr/>
-        </p:nvSpPr>
-        <p:spPr>
-          <a:xfrm>
-            <a:off x="234882" y="2539300"/>
-            <a:ext cx="1339676" cy="368242"/>
-          </a:xfrm>
-          <a:prstGeom prst="roundRect">
-            <a:avLst/>
-          </a:prstGeom>
-          <a:gradFill>
-            <a:gsLst>
-              <a:gs pos="0">
-                <a:schemeClr val="bg1">
-                  <a:lumMod val="75000"/>
-                </a:schemeClr>
-              </a:gs>
-              <a:gs pos="100000">
-                <a:schemeClr val="bg1">
-                  <a:lumMod val="95000"/>
-                </a:schemeClr>
-              </a:gs>
-            </a:gsLst>
-          </a:gradFill>
-        </p:spPr>
-        <p:style>
-          <a:lnRef idx="1">
-            <a:schemeClr val="dk1"/>
-          </a:lnRef>
-          <a:fillRef idx="3">
-            <a:schemeClr val="dk1"/>
-          </a:fillRef>
-          <a:effectRef idx="2">
-            <a:schemeClr val="dk1"/>
-          </a:effectRef>
-          <a:fontRef idx="minor">
-            <a:schemeClr val="lt1"/>
-          </a:fontRef>
-        </p:style>
-        <p:txBody>
-          <a:bodyPr rtlCol="0" anchor="ctr"/>
-          <a:lstStyle/>
-          <a:p>
-            <a:pPr algn="ctr"/>
-            <a:r>
-              <a:rPr kumimoji="1" lang="en-US" altLang="ja-JP" sz="1600" dirty="0" smtClean="0">
-                <a:solidFill>
-                  <a:schemeClr val="tx1">
-                    <a:lumMod val="75000"/>
-                    <a:lumOff val="25000"/>
-                  </a:schemeClr>
-                </a:solidFill>
-              </a:rPr>
-              <a:t>parent</a:t>
-            </a:r>
-          </a:p>
-        </p:txBody>
-      </p:sp>
-      <p:cxnSp>
-        <p:nvCxnSpPr>
-          <p:cNvPr id="3" name="直線コネクタ 2"/>
-          <p:cNvCxnSpPr>
-            <a:stCxn id="47" idx="2"/>
-            <a:endCxn id="46" idx="0"/>
-          </p:cNvCxnSpPr>
-          <p:nvPr/>
-        </p:nvCxnSpPr>
-        <p:spPr>
-          <a:xfrm>
-            <a:off x="4800309" y="4146787"/>
-            <a:ext cx="8138" cy="278243"/>
-          </a:xfrm>
-          <a:prstGeom prst="straightConnector1">
-            <a:avLst/>
-          </a:prstGeom>
-          <a:ln w="12700" cmpd="sng">
-            <a:solidFill>
-              <a:schemeClr val="tx1">
-                <a:lumMod val="50000"/>
-                <a:lumOff val="50000"/>
-              </a:schemeClr>
-            </a:solidFill>
-            <a:prstDash val="sysDash"/>
-            <a:headEnd type="none"/>
-            <a:tailEnd type="arrow"/>
-          </a:ln>
-        </p:spPr>
-        <p:style>
-          <a:lnRef idx="2">
-            <a:schemeClr val="accent1"/>
-          </a:lnRef>
-          <a:fillRef idx="0">
-            <a:schemeClr val="accent1"/>
-          </a:fillRef>
-          <a:effectRef idx="1">
-            <a:schemeClr val="accent1"/>
-          </a:effectRef>
-          <a:fontRef idx="minor">
-            <a:schemeClr val="tx1"/>
-          </a:fontRef>
-        </p:style>
-      </p:cxnSp>
       <p:cxnSp>
         <p:nvCxnSpPr>
           <p:cNvPr id="57" name="直線コネクタ 2"/>
@@ -7533,7 +7419,7 @@
         </p:nvCxnSpPr>
         <p:spPr>
           <a:xfrm flipV="1">
-            <a:off x="4803486" y="2853817"/>
+            <a:off x="2076647" y="2816527"/>
             <a:ext cx="0" cy="278243"/>
           </a:xfrm>
           <a:prstGeom prst="straightConnector1">
@@ -7577,7 +7463,7 @@
         </p:nvCxnSpPr>
         <p:spPr>
           <a:xfrm flipH="1">
-            <a:off x="4798524" y="1560847"/>
+            <a:off x="2071685" y="1523557"/>
             <a:ext cx="1" cy="278243"/>
           </a:xfrm>
           <a:prstGeom prst="straightConnector1">
@@ -7621,7 +7507,7 @@
         </p:nvCxnSpPr>
         <p:spPr>
           <a:xfrm flipH="1" flipV="1">
-            <a:off x="4798524" y="2207332"/>
+            <a:off x="2071685" y="2170042"/>
             <a:ext cx="4962" cy="278243"/>
           </a:xfrm>
           <a:prstGeom prst="straightConnector1">
@@ -7662,7 +7548,7 @@
         </p:nvSpPr>
         <p:spPr>
           <a:xfrm>
-            <a:off x="4897745" y="1542952"/>
+            <a:off x="2170906" y="1505662"/>
             <a:ext cx="810851" cy="307777"/>
           </a:xfrm>
           <a:prstGeom prst="rect">
@@ -7706,7 +7592,7 @@
         </p:nvSpPr>
         <p:spPr>
           <a:xfrm>
-            <a:off x="4897953" y="2189274"/>
+            <a:off x="2171114" y="2151984"/>
             <a:ext cx="810851" cy="307777"/>
           </a:xfrm>
           <a:prstGeom prst="rect">
@@ -7750,7 +7636,7 @@
         </p:nvSpPr>
         <p:spPr>
           <a:xfrm>
-            <a:off x="4897745" y="2836398"/>
+            <a:off x="2170906" y="2799108"/>
             <a:ext cx="810851" cy="307777"/>
           </a:xfrm>
           <a:prstGeom prst="rect">
@@ -7794,7 +7680,7 @@
         </p:nvSpPr>
         <p:spPr>
           <a:xfrm>
-            <a:off x="6712069" y="3467693"/>
+            <a:off x="99969" y="3449965"/>
             <a:ext cx="810851" cy="307777"/>
           </a:xfrm>
           <a:prstGeom prst="rect">
@@ -7830,21 +7716,1287 @@
           </a:p>
         </p:txBody>
       </p:sp>
+      <p:sp>
+        <p:nvSpPr>
+          <p:cNvPr id="34" name="角丸四角形 33"/>
+          <p:cNvSpPr/>
+          <p:nvPr/>
+        </p:nvSpPr>
+        <p:spPr>
+          <a:xfrm>
+            <a:off x="368094" y="5080969"/>
+            <a:ext cx="3387338" cy="368242"/>
+          </a:xfrm>
+          <a:prstGeom prst="roundRect">
+            <a:avLst/>
+          </a:prstGeom>
+          <a:gradFill>
+            <a:gsLst>
+              <a:gs pos="0">
+                <a:schemeClr val="bg1">
+                  <a:lumMod val="75000"/>
+                </a:schemeClr>
+              </a:gs>
+              <a:gs pos="100000">
+                <a:schemeClr val="bg1">
+                  <a:lumMod val="95000"/>
+                </a:schemeClr>
+              </a:gs>
+            </a:gsLst>
+          </a:gradFill>
+        </p:spPr>
+        <p:style>
+          <a:lnRef idx="1">
+            <a:schemeClr val="dk1"/>
+          </a:lnRef>
+          <a:fillRef idx="3">
+            <a:schemeClr val="dk1"/>
+          </a:fillRef>
+          <a:effectRef idx="2">
+            <a:schemeClr val="dk1"/>
+          </a:effectRef>
+          <a:fontRef idx="minor">
+            <a:schemeClr val="lt1"/>
+          </a:fontRef>
+        </p:style>
+        <p:txBody>
+          <a:bodyPr rtlCol="0" anchor="ctr"/>
+          <a:lstStyle/>
+          <a:p>
+            <a:pPr algn="ctr"/>
+            <a:r>
+              <a:rPr lang="en-US" altLang="ja-JP" sz="1600" dirty="0" err="1" smtClean="0">
+                <a:solidFill>
+                  <a:schemeClr val="tx1">
+                    <a:lumMod val="75000"/>
+                    <a:lumOff val="25000"/>
+                  </a:schemeClr>
+                </a:solidFill>
+              </a:rPr>
+              <a:t>codepoints</a:t>
+            </a:r>
+            <a:endParaRPr kumimoji="1" lang="en-US" altLang="ja-JP" sz="1600" dirty="0" smtClean="0">
+              <a:solidFill>
+                <a:schemeClr val="tx1">
+                  <a:lumMod val="75000"/>
+                  <a:lumOff val="25000"/>
+                </a:schemeClr>
+              </a:solidFill>
+            </a:endParaRPr>
+          </a:p>
+        </p:txBody>
+      </p:sp>
+      <p:sp>
+        <p:nvSpPr>
+          <p:cNvPr id="35" name="角丸四角形 34"/>
+          <p:cNvSpPr/>
+          <p:nvPr/>
+        </p:nvSpPr>
+        <p:spPr>
+          <a:xfrm>
+            <a:off x="368094" y="4434484"/>
+            <a:ext cx="3387338" cy="368242"/>
+          </a:xfrm>
+          <a:prstGeom prst="roundRect">
+            <a:avLst/>
+          </a:prstGeom>
+          <a:gradFill>
+            <a:gsLst>
+              <a:gs pos="0">
+                <a:schemeClr val="bg1">
+                  <a:lumMod val="75000"/>
+                </a:schemeClr>
+              </a:gs>
+              <a:gs pos="100000">
+                <a:schemeClr val="bg1">
+                  <a:lumMod val="95000"/>
+                </a:schemeClr>
+              </a:gs>
+            </a:gsLst>
+          </a:gradFill>
+        </p:spPr>
+        <p:style>
+          <a:lnRef idx="1">
+            <a:schemeClr val="dk1"/>
+          </a:lnRef>
+          <a:fillRef idx="3">
+            <a:schemeClr val="dk1"/>
+          </a:fillRef>
+          <a:effectRef idx="2">
+            <a:schemeClr val="dk1"/>
+          </a:effectRef>
+          <a:fontRef idx="minor">
+            <a:schemeClr val="lt1"/>
+          </a:fontRef>
+        </p:style>
+        <p:txBody>
+          <a:bodyPr rtlCol="0" anchor="ctr"/>
+          <a:lstStyle/>
+          <a:p>
+            <a:pPr algn="ctr"/>
+            <a:r>
+              <a:rPr kumimoji="1" lang="en-US" altLang="ja-JP" sz="1600" dirty="0" smtClean="0">
+                <a:solidFill>
+                  <a:schemeClr val="tx1">
+                    <a:lumMod val="75000"/>
+                    <a:lumOff val="25000"/>
+                  </a:schemeClr>
+                </a:solidFill>
+              </a:rPr>
+              <a:t>string</a:t>
+            </a:r>
+          </a:p>
+        </p:txBody>
+      </p:sp>
+      <p:sp>
+        <p:nvSpPr>
+          <p:cNvPr id="36" name="角丸四角形 35"/>
+          <p:cNvSpPr/>
+          <p:nvPr/>
+        </p:nvSpPr>
+        <p:spPr>
+          <a:xfrm>
+            <a:off x="368094" y="5727454"/>
+            <a:ext cx="3387338" cy="368242"/>
+          </a:xfrm>
+          <a:prstGeom prst="roundRect">
+            <a:avLst/>
+          </a:prstGeom>
+          <a:gradFill>
+            <a:gsLst>
+              <a:gs pos="0">
+                <a:schemeClr val="bg1">
+                  <a:lumMod val="75000"/>
+                </a:schemeClr>
+              </a:gs>
+              <a:gs pos="100000">
+                <a:schemeClr val="bg1">
+                  <a:lumMod val="95000"/>
+                </a:schemeClr>
+              </a:gs>
+            </a:gsLst>
+          </a:gradFill>
+        </p:spPr>
+        <p:style>
+          <a:lnRef idx="1">
+            <a:schemeClr val="dk1"/>
+          </a:lnRef>
+          <a:fillRef idx="3">
+            <a:schemeClr val="dk1"/>
+          </a:fillRef>
+          <a:effectRef idx="2">
+            <a:schemeClr val="dk1"/>
+          </a:effectRef>
+          <a:fontRef idx="minor">
+            <a:schemeClr val="lt1"/>
+          </a:fontRef>
+        </p:style>
+        <p:txBody>
+          <a:bodyPr rtlCol="0" anchor="ctr"/>
+          <a:lstStyle/>
+          <a:p>
+            <a:pPr algn="ctr"/>
+            <a:r>
+              <a:rPr lang="en-US" altLang="ja-JP" sz="1600" dirty="0" smtClean="0">
+                <a:solidFill>
+                  <a:schemeClr val="tx1">
+                    <a:lumMod val="75000"/>
+                    <a:lumOff val="25000"/>
+                  </a:schemeClr>
+                </a:solidFill>
+              </a:rPr>
+              <a:t>validator</a:t>
+            </a:r>
+            <a:endParaRPr kumimoji="1" lang="en-US" altLang="ja-JP" sz="1600" dirty="0" smtClean="0">
+              <a:solidFill>
+                <a:schemeClr val="tx1">
+                  <a:lumMod val="75000"/>
+                  <a:lumOff val="25000"/>
+                </a:schemeClr>
+              </a:solidFill>
+            </a:endParaRPr>
+          </a:p>
+        </p:txBody>
+      </p:sp>
+      <p:sp>
+        <p:nvSpPr>
+          <p:cNvPr id="60" name="角丸四角形 59"/>
+          <p:cNvSpPr/>
+          <p:nvPr/>
+        </p:nvSpPr>
+        <p:spPr>
+          <a:xfrm>
+            <a:off x="387939" y="3094770"/>
+            <a:ext cx="3377415" cy="368242"/>
+          </a:xfrm>
+          <a:prstGeom prst="roundRect">
+            <a:avLst/>
+          </a:prstGeom>
+          <a:gradFill>
+            <a:gsLst>
+              <a:gs pos="0">
+                <a:schemeClr val="bg1">
+                  <a:lumMod val="75000"/>
+                </a:schemeClr>
+              </a:gs>
+              <a:gs pos="100000">
+                <a:schemeClr val="bg1">
+                  <a:lumMod val="95000"/>
+                </a:schemeClr>
+              </a:gs>
+            </a:gsLst>
+          </a:gradFill>
+        </p:spPr>
+        <p:style>
+          <a:lnRef idx="1">
+            <a:schemeClr val="dk1"/>
+          </a:lnRef>
+          <a:fillRef idx="3">
+            <a:schemeClr val="dk1"/>
+          </a:fillRef>
+          <a:effectRef idx="2">
+            <a:schemeClr val="dk1"/>
+          </a:effectRef>
+          <a:fontRef idx="minor">
+            <a:schemeClr val="lt1"/>
+          </a:fontRef>
+        </p:style>
+        <p:txBody>
+          <a:bodyPr rtlCol="0" anchor="ctr"/>
+          <a:lstStyle/>
+          <a:p>
+            <a:pPr algn="ctr"/>
+            <a:r>
+              <a:rPr kumimoji="1" lang="en-US" altLang="ja-JP" sz="1600" dirty="0" smtClean="0">
+                <a:solidFill>
+                  <a:schemeClr val="tx1">
+                    <a:lumMod val="75000"/>
+                    <a:lumOff val="25000"/>
+                  </a:schemeClr>
+                </a:solidFill>
+              </a:rPr>
+              <a:t>web</a:t>
+            </a:r>
+            <a:r>
+              <a:rPr lang="en-US" altLang="ja-JP" sz="1600" dirty="0" smtClean="0">
+                <a:solidFill>
+                  <a:schemeClr val="tx1">
+                    <a:lumMod val="75000"/>
+                    <a:lumOff val="25000"/>
+                  </a:schemeClr>
+                </a:solidFill>
+              </a:rPr>
+              <a:t>-</a:t>
+            </a:r>
+            <a:r>
+              <a:rPr lang="en-US" altLang="ja-JP" sz="1600" dirty="0" err="1" smtClean="0">
+                <a:solidFill>
+                  <a:schemeClr val="tx1">
+                    <a:lumMod val="75000"/>
+                    <a:lumOff val="25000"/>
+                  </a:schemeClr>
+                </a:solidFill>
+              </a:rPr>
+              <a:t>jsp</a:t>
+            </a:r>
+            <a:endParaRPr kumimoji="1" lang="en-US" altLang="ja-JP" sz="1600" dirty="0" smtClean="0">
+              <a:solidFill>
+                <a:schemeClr val="tx1">
+                  <a:lumMod val="75000"/>
+                  <a:lumOff val="25000"/>
+                </a:schemeClr>
+              </a:solidFill>
+            </a:endParaRPr>
+          </a:p>
+        </p:txBody>
+      </p:sp>
+      <p:sp>
+        <p:nvSpPr>
+          <p:cNvPr id="69" name="テキスト ボックス 68"/>
+          <p:cNvSpPr txBox="1"/>
+          <p:nvPr/>
+        </p:nvSpPr>
+        <p:spPr>
+          <a:xfrm>
+            <a:off x="7158523" y="1145849"/>
+            <a:ext cx="810851" cy="307777"/>
+          </a:xfrm>
+          <a:prstGeom prst="rect">
+            <a:avLst/>
+          </a:prstGeom>
+          <a:noFill/>
+        </p:spPr>
+        <p:txBody>
+          <a:bodyPr wrap="none" rtlCol="0">
+            <a:spAutoFit/>
+          </a:bodyPr>
+          <a:lstStyle/>
+          <a:p>
+            <a:r>
+              <a:rPr kumimoji="1" lang="en-US" altLang="ja-JP" sz="1400" dirty="0" smtClean="0">
+                <a:solidFill>
+                  <a:schemeClr val="tx1">
+                    <a:lumMod val="50000"/>
+                    <a:lumOff val="50000"/>
+                  </a:schemeClr>
+                </a:solidFill>
+              </a:rPr>
+              <a:t>depends</a:t>
+            </a:r>
+            <a:endParaRPr kumimoji="1" lang="ja-JP" altLang="en-US" sz="1400" dirty="0">
+              <a:solidFill>
+                <a:schemeClr val="tx1">
+                  <a:lumMod val="50000"/>
+                  <a:lumOff val="50000"/>
+                </a:schemeClr>
+              </a:solidFill>
+            </a:endParaRPr>
+          </a:p>
+        </p:txBody>
+      </p:sp>
       <p:cxnSp>
         <p:nvCxnSpPr>
-          <p:cNvPr id="94" name="直線コネクタ 2"/>
+          <p:cNvPr id="21" name="カギ線コネクタ 20"/>
           <p:cNvCxnSpPr>
-            <a:stCxn id="55" idx="1"/>
-            <a:endCxn id="56" idx="3"/>
+            <a:stCxn id="47" idx="1"/>
+            <a:endCxn id="53" idx="1"/>
           </p:cNvCxnSpPr>
           <p:nvPr/>
         </p:nvCxnSpPr>
         <p:spPr>
+          <a:xfrm rot="10800000">
+            <a:off x="387940" y="2632406"/>
+            <a:ext cx="3569" cy="1292970"/>
+          </a:xfrm>
+          <a:prstGeom prst="bentConnector3">
+            <a:avLst>
+              <a:gd name="adj1" fmla="val 6505156"/>
+            </a:avLst>
+          </a:prstGeom>
+          <a:ln w="12700" cmpd="sng">
+            <a:solidFill>
+              <a:schemeClr val="tx1">
+                <a:lumMod val="50000"/>
+                <a:lumOff val="50000"/>
+              </a:schemeClr>
+            </a:solidFill>
+            <a:prstDash val="sysDash"/>
+            <a:headEnd type="none"/>
+            <a:tailEnd type="triangle"/>
+          </a:ln>
+        </p:spPr>
+        <p:style>
+          <a:lnRef idx="2">
+            <a:schemeClr val="accent1"/>
+          </a:lnRef>
+          <a:fillRef idx="0">
+            <a:schemeClr val="accent1"/>
+          </a:fillRef>
+          <a:effectRef idx="1">
+            <a:schemeClr val="accent1"/>
+          </a:effectRef>
+          <a:fontRef idx="minor">
+            <a:schemeClr val="tx1"/>
+          </a:fontRef>
+        </p:style>
+      </p:cxnSp>
+      <p:sp>
+        <p:nvSpPr>
+          <p:cNvPr id="62" name="角丸四角形 61"/>
+          <p:cNvSpPr/>
+          <p:nvPr/>
+        </p:nvSpPr>
+        <p:spPr>
+          <a:xfrm>
+            <a:off x="962795" y="-783743"/>
+            <a:ext cx="2264228" cy="368242"/>
+          </a:xfrm>
+          <a:prstGeom prst="roundRect">
+            <a:avLst/>
+          </a:prstGeom>
+          <a:gradFill>
+            <a:gsLst>
+              <a:gs pos="0">
+                <a:schemeClr val="bg1">
+                  <a:lumMod val="75000"/>
+                </a:schemeClr>
+              </a:gs>
+              <a:gs pos="100000">
+                <a:schemeClr val="bg1">
+                  <a:lumMod val="95000"/>
+                </a:schemeClr>
+              </a:gs>
+            </a:gsLst>
+          </a:gradFill>
+        </p:spPr>
+        <p:style>
+          <a:lnRef idx="1">
+            <a:schemeClr val="dk1"/>
+          </a:lnRef>
+          <a:fillRef idx="3">
+            <a:schemeClr val="dk1"/>
+          </a:fillRef>
+          <a:effectRef idx="2">
+            <a:schemeClr val="dk1"/>
+          </a:effectRef>
+          <a:fontRef idx="minor">
+            <a:schemeClr val="lt1"/>
+          </a:fontRef>
+        </p:style>
+        <p:txBody>
+          <a:bodyPr rtlCol="0" anchor="ctr"/>
+          <a:lstStyle/>
+          <a:p>
+            <a:pPr algn="ctr"/>
+            <a:r>
+              <a:rPr kumimoji="1" lang="en-US" altLang="ja-JP" sz="1600" dirty="0" smtClean="0">
+                <a:solidFill>
+                  <a:schemeClr val="tx1">
+                    <a:lumMod val="75000"/>
+                    <a:lumOff val="25000"/>
+                  </a:schemeClr>
+                </a:solidFill>
+              </a:rPr>
+              <a:t>Common-libraries</a:t>
+            </a:r>
+          </a:p>
+        </p:txBody>
+      </p:sp>
+      <p:sp>
+        <p:nvSpPr>
+          <p:cNvPr id="63" name="角丸四角形 62"/>
+          <p:cNvSpPr/>
+          <p:nvPr/>
+        </p:nvSpPr>
+        <p:spPr>
+          <a:xfrm>
+            <a:off x="5965101" y="-783743"/>
+            <a:ext cx="2264229" cy="368242"/>
+          </a:xfrm>
+          <a:prstGeom prst="roundRect">
+            <a:avLst/>
+          </a:prstGeom>
+          <a:gradFill>
+            <a:gsLst>
+              <a:gs pos="0">
+                <a:schemeClr val="bg1">
+                  <a:lumMod val="75000"/>
+                </a:schemeClr>
+              </a:gs>
+              <a:gs pos="100000">
+                <a:schemeClr val="bg1">
+                  <a:lumMod val="95000"/>
+                </a:schemeClr>
+              </a:gs>
+            </a:gsLst>
+          </a:gradFill>
+        </p:spPr>
+        <p:style>
+          <a:lnRef idx="1">
+            <a:schemeClr val="dk1"/>
+          </a:lnRef>
+          <a:fillRef idx="3">
+            <a:schemeClr val="dk1"/>
+          </a:fillRef>
+          <a:effectRef idx="2">
+            <a:schemeClr val="dk1"/>
+          </a:effectRef>
+          <a:fontRef idx="minor">
+            <a:schemeClr val="lt1"/>
+          </a:fontRef>
+        </p:style>
+        <p:txBody>
+          <a:bodyPr rtlCol="0" anchor="ctr"/>
+          <a:lstStyle/>
+          <a:p>
+            <a:pPr algn="ctr"/>
+            <a:r>
+              <a:rPr kumimoji="1" lang="en-US" altLang="ja-JP" sz="1600" dirty="0" smtClean="0">
+                <a:solidFill>
+                  <a:schemeClr val="tx1">
+                    <a:lumMod val="75000"/>
+                    <a:lumOff val="25000"/>
+                  </a:schemeClr>
+                </a:solidFill>
+              </a:rPr>
+              <a:t>dependencies</a:t>
+            </a:r>
+          </a:p>
+        </p:txBody>
+      </p:sp>
+      <p:sp>
+        <p:nvSpPr>
+          <p:cNvPr id="86" name="角丸四角形 85"/>
+          <p:cNvSpPr/>
+          <p:nvPr/>
+        </p:nvSpPr>
+        <p:spPr>
+          <a:xfrm>
+            <a:off x="3932190" y="-2365948"/>
+            <a:ext cx="1339676" cy="368242"/>
+          </a:xfrm>
+          <a:prstGeom prst="roundRect">
+            <a:avLst/>
+          </a:prstGeom>
+          <a:gradFill>
+            <a:gsLst>
+              <a:gs pos="0">
+                <a:schemeClr val="bg1">
+                  <a:lumMod val="75000"/>
+                </a:schemeClr>
+              </a:gs>
+              <a:gs pos="100000">
+                <a:schemeClr val="bg1">
+                  <a:lumMod val="95000"/>
+                </a:schemeClr>
+              </a:gs>
+            </a:gsLst>
+          </a:gradFill>
+        </p:spPr>
+        <p:style>
+          <a:lnRef idx="1">
+            <a:schemeClr val="dk1"/>
+          </a:lnRef>
+          <a:fillRef idx="3">
+            <a:schemeClr val="dk1"/>
+          </a:fillRef>
+          <a:effectRef idx="2">
+            <a:schemeClr val="dk1"/>
+          </a:effectRef>
+          <a:fontRef idx="minor">
+            <a:schemeClr val="lt1"/>
+          </a:fontRef>
+        </p:style>
+        <p:txBody>
+          <a:bodyPr rtlCol="0" anchor="ctr"/>
+          <a:lstStyle/>
+          <a:p>
+            <a:pPr algn="ctr"/>
+            <a:r>
+              <a:rPr kumimoji="1" lang="en-US" altLang="ja-JP" sz="1600" dirty="0" smtClean="0">
+                <a:solidFill>
+                  <a:schemeClr val="tx1">
+                    <a:lumMod val="75000"/>
+                    <a:lumOff val="25000"/>
+                  </a:schemeClr>
+                </a:solidFill>
+              </a:rPr>
+              <a:t>parent</a:t>
+            </a:r>
+          </a:p>
+        </p:txBody>
+      </p:sp>
+      <p:sp>
+        <p:nvSpPr>
+          <p:cNvPr id="98" name="テキスト ボックス 97"/>
+          <p:cNvSpPr txBox="1"/>
+          <p:nvPr/>
+        </p:nvSpPr>
+        <p:spPr>
+          <a:xfrm>
+            <a:off x="3871688" y="-1857768"/>
+            <a:ext cx="671378" cy="307777"/>
+          </a:xfrm>
+          <a:prstGeom prst="rect">
+            <a:avLst/>
+          </a:prstGeom>
+          <a:noFill/>
+        </p:spPr>
+        <p:txBody>
+          <a:bodyPr wrap="none" rtlCol="0">
+            <a:spAutoFit/>
+          </a:bodyPr>
+          <a:lstStyle/>
+          <a:p>
+            <a:r>
+              <a:rPr kumimoji="1" lang="en-US" altLang="ja-JP" sz="1400" dirty="0" smtClean="0">
+                <a:solidFill>
+                  <a:schemeClr val="tx1">
+                    <a:lumMod val="50000"/>
+                    <a:lumOff val="50000"/>
+                  </a:schemeClr>
+                </a:solidFill>
+              </a:rPr>
+              <a:t>parent</a:t>
+            </a:r>
+            <a:endParaRPr kumimoji="1" lang="ja-JP" altLang="en-US" sz="1400" dirty="0">
+              <a:solidFill>
+                <a:schemeClr val="tx1">
+                  <a:lumMod val="50000"/>
+                  <a:lumOff val="50000"/>
+                </a:schemeClr>
+              </a:solidFill>
+            </a:endParaRPr>
+          </a:p>
+        </p:txBody>
+      </p:sp>
+      <p:sp>
+        <p:nvSpPr>
+          <p:cNvPr id="168" name="テキスト ボックス 167"/>
+          <p:cNvSpPr txBox="1"/>
+          <p:nvPr/>
+        </p:nvSpPr>
+        <p:spPr>
+          <a:xfrm>
+            <a:off x="1160869" y="42439"/>
+            <a:ext cx="1205409" cy="307777"/>
+          </a:xfrm>
+          <a:prstGeom prst="rect">
+            <a:avLst/>
+          </a:prstGeom>
+          <a:noFill/>
+        </p:spPr>
+        <p:txBody>
+          <a:bodyPr wrap="square" rtlCol="0">
+            <a:spAutoFit/>
+          </a:bodyPr>
+          <a:lstStyle/>
+          <a:p>
+            <a:pPr algn="ctr"/>
+            <a:r>
+              <a:rPr kumimoji="1" lang="en-US" altLang="ja-JP" sz="1400" dirty="0" smtClean="0">
+                <a:solidFill>
+                  <a:schemeClr val="tx1">
+                    <a:lumMod val="50000"/>
+                    <a:lumOff val="50000"/>
+                  </a:schemeClr>
+                </a:solidFill>
+              </a:rPr>
+              <a:t>parent</a:t>
+            </a:r>
+            <a:endParaRPr kumimoji="1" lang="ja-JP" altLang="en-US" sz="1400" dirty="0">
+              <a:solidFill>
+                <a:schemeClr val="tx1">
+                  <a:lumMod val="50000"/>
+                  <a:lumOff val="50000"/>
+                </a:schemeClr>
+              </a:solidFill>
+            </a:endParaRPr>
+          </a:p>
+        </p:txBody>
+      </p:sp>
+      <p:sp>
+        <p:nvSpPr>
+          <p:cNvPr id="215" name="角丸四角形 214"/>
+          <p:cNvSpPr/>
+          <p:nvPr/>
+        </p:nvSpPr>
+        <p:spPr>
+          <a:xfrm>
+            <a:off x="5377732" y="1801859"/>
+            <a:ext cx="3363925" cy="368242"/>
+          </a:xfrm>
+          <a:prstGeom prst="roundRect">
+            <a:avLst/>
+          </a:prstGeom>
+          <a:gradFill>
+            <a:gsLst>
+              <a:gs pos="0">
+                <a:schemeClr val="bg1">
+                  <a:lumMod val="75000"/>
+                </a:schemeClr>
+              </a:gs>
+              <a:gs pos="100000">
+                <a:schemeClr val="bg1">
+                  <a:lumMod val="95000"/>
+                </a:schemeClr>
+              </a:gs>
+            </a:gsLst>
+          </a:gradFill>
+        </p:spPr>
+        <p:style>
+          <a:lnRef idx="1">
+            <a:schemeClr val="dk1"/>
+          </a:lnRef>
+          <a:fillRef idx="3">
+            <a:schemeClr val="dk1"/>
+          </a:fillRef>
+          <a:effectRef idx="2">
+            <a:schemeClr val="dk1"/>
+          </a:effectRef>
+          <a:fontRef idx="minor">
+            <a:schemeClr val="lt1"/>
+          </a:fontRef>
+        </p:style>
+        <p:txBody>
+          <a:bodyPr rtlCol="0" anchor="ctr"/>
+          <a:lstStyle/>
+          <a:p>
+            <a:pPr algn="ctr"/>
+            <a:r>
+              <a:rPr lang="en-US" altLang="ja-JP" sz="1600" dirty="0" smtClean="0">
+                <a:solidFill>
+                  <a:schemeClr val="tx1">
+                    <a:lumMod val="75000"/>
+                    <a:lumOff val="25000"/>
+                  </a:schemeClr>
+                </a:solidFill>
+              </a:rPr>
+              <a:t>common-dependencies</a:t>
+            </a:r>
+            <a:endParaRPr kumimoji="1" lang="en-US" altLang="ja-JP" sz="1600" dirty="0" smtClean="0">
+              <a:solidFill>
+                <a:schemeClr val="tx1">
+                  <a:lumMod val="75000"/>
+                  <a:lumOff val="25000"/>
+                </a:schemeClr>
+              </a:solidFill>
+            </a:endParaRPr>
+          </a:p>
+        </p:txBody>
+      </p:sp>
+      <p:sp>
+        <p:nvSpPr>
+          <p:cNvPr id="216" name="角丸四角形 215"/>
+          <p:cNvSpPr/>
+          <p:nvPr/>
+        </p:nvSpPr>
+        <p:spPr>
+          <a:xfrm>
+            <a:off x="5387903" y="2448341"/>
+            <a:ext cx="3353754" cy="368242"/>
+          </a:xfrm>
+          <a:prstGeom prst="roundRect">
+            <a:avLst/>
+          </a:prstGeom>
+          <a:gradFill>
+            <a:gsLst>
+              <a:gs pos="0">
+                <a:schemeClr val="bg1">
+                  <a:lumMod val="75000"/>
+                </a:schemeClr>
+              </a:gs>
+              <a:gs pos="100000">
+                <a:schemeClr val="bg1">
+                  <a:lumMod val="95000"/>
+                </a:schemeClr>
+              </a:gs>
+            </a:gsLst>
+          </a:gradFill>
+        </p:spPr>
+        <p:style>
+          <a:lnRef idx="1">
+            <a:schemeClr val="dk1"/>
+          </a:lnRef>
+          <a:fillRef idx="3">
+            <a:schemeClr val="dk1"/>
+          </a:fillRef>
+          <a:effectRef idx="2">
+            <a:schemeClr val="dk1"/>
+          </a:effectRef>
+          <a:fontRef idx="minor">
+            <a:schemeClr val="lt1"/>
+          </a:fontRef>
+        </p:style>
+        <p:txBody>
+          <a:bodyPr rtlCol="0" anchor="ctr"/>
+          <a:lstStyle/>
+          <a:p>
+            <a:pPr algn="ctr"/>
+            <a:r>
+              <a:rPr lang="en-US" altLang="ja-JP" sz="1600" dirty="0" smtClean="0">
+                <a:solidFill>
+                  <a:schemeClr val="tx1">
+                    <a:lumMod val="75000"/>
+                    <a:lumOff val="25000"/>
+                  </a:schemeClr>
+                </a:solidFill>
+              </a:rPr>
+              <a:t>web-dependencies</a:t>
+            </a:r>
+            <a:endParaRPr kumimoji="1" lang="en-US" altLang="ja-JP" sz="1600" dirty="0" smtClean="0">
+              <a:solidFill>
+                <a:schemeClr val="tx1">
+                  <a:lumMod val="75000"/>
+                  <a:lumOff val="25000"/>
+                </a:schemeClr>
+              </a:solidFill>
+            </a:endParaRPr>
+          </a:p>
+        </p:txBody>
+      </p:sp>
+      <p:sp>
+        <p:nvSpPr>
+          <p:cNvPr id="218" name="角丸四角形 217"/>
+          <p:cNvSpPr/>
+          <p:nvPr/>
+        </p:nvSpPr>
+        <p:spPr>
+          <a:xfrm>
+            <a:off x="5367810" y="1154316"/>
+            <a:ext cx="3387338" cy="368242"/>
+          </a:xfrm>
+          <a:prstGeom prst="roundRect">
+            <a:avLst/>
+          </a:prstGeom>
+          <a:gradFill>
+            <a:gsLst>
+              <a:gs pos="0">
+                <a:schemeClr val="bg1">
+                  <a:lumMod val="75000"/>
+                </a:schemeClr>
+              </a:gs>
+              <a:gs pos="100000">
+                <a:schemeClr val="bg1">
+                  <a:lumMod val="95000"/>
+                </a:schemeClr>
+              </a:gs>
+            </a:gsLst>
+          </a:gradFill>
+        </p:spPr>
+        <p:style>
+          <a:lnRef idx="1">
+            <a:schemeClr val="dk1"/>
+          </a:lnRef>
+          <a:fillRef idx="3">
+            <a:schemeClr val="dk1"/>
+          </a:fillRef>
+          <a:effectRef idx="2">
+            <a:schemeClr val="dk1"/>
+          </a:effectRef>
+          <a:fontRef idx="minor">
+            <a:schemeClr val="lt1"/>
+          </a:fontRef>
+        </p:style>
+        <p:txBody>
+          <a:bodyPr rtlCol="0" anchor="ctr"/>
+          <a:lstStyle/>
+          <a:p>
+            <a:pPr algn="ctr"/>
+            <a:r>
+              <a:rPr kumimoji="1" lang="en-US" altLang="ja-JP" sz="1600" dirty="0" err="1" smtClean="0">
+                <a:solidFill>
+                  <a:schemeClr val="tx1">
+                    <a:lumMod val="75000"/>
+                    <a:lumOff val="25000"/>
+                  </a:schemeClr>
+                </a:solidFill>
+              </a:rPr>
+              <a:t>jodatime</a:t>
+            </a:r>
+            <a:r>
+              <a:rPr kumimoji="1" lang="en-US" altLang="ja-JP" sz="1600" dirty="0" smtClean="0">
+                <a:solidFill>
+                  <a:schemeClr val="tx1">
+                    <a:lumMod val="75000"/>
+                    <a:lumOff val="25000"/>
+                  </a:schemeClr>
+                </a:solidFill>
+              </a:rPr>
+              <a:t>-dependencies</a:t>
+            </a:r>
+          </a:p>
+        </p:txBody>
+      </p:sp>
+      <p:sp>
+        <p:nvSpPr>
+          <p:cNvPr id="68" name="角丸四角形 67"/>
+          <p:cNvSpPr/>
+          <p:nvPr/>
+        </p:nvSpPr>
+        <p:spPr>
+          <a:xfrm>
+            <a:off x="5392138" y="3099206"/>
+            <a:ext cx="3353754" cy="368242"/>
+          </a:xfrm>
+          <a:prstGeom prst="roundRect">
+            <a:avLst/>
+          </a:prstGeom>
+          <a:gradFill>
+            <a:gsLst>
+              <a:gs pos="0">
+                <a:schemeClr val="bg1">
+                  <a:lumMod val="75000"/>
+                </a:schemeClr>
+              </a:gs>
+              <a:gs pos="100000">
+                <a:schemeClr val="bg1">
+                  <a:lumMod val="95000"/>
+                </a:schemeClr>
+              </a:gs>
+            </a:gsLst>
+          </a:gradFill>
+        </p:spPr>
+        <p:style>
+          <a:lnRef idx="1">
+            <a:schemeClr val="dk1"/>
+          </a:lnRef>
+          <a:fillRef idx="3">
+            <a:schemeClr val="dk1"/>
+          </a:fillRef>
+          <a:effectRef idx="2">
+            <a:schemeClr val="dk1"/>
+          </a:effectRef>
+          <a:fontRef idx="minor">
+            <a:schemeClr val="lt1"/>
+          </a:fontRef>
+        </p:style>
+        <p:txBody>
+          <a:bodyPr rtlCol="0" anchor="ctr"/>
+          <a:lstStyle/>
+          <a:p>
+            <a:pPr algn="ctr"/>
+            <a:r>
+              <a:rPr lang="en-US" altLang="ja-JP" sz="1600" dirty="0">
+                <a:solidFill>
+                  <a:schemeClr val="tx1">
+                    <a:lumMod val="75000"/>
+                    <a:lumOff val="25000"/>
+                  </a:schemeClr>
+                </a:solidFill>
+              </a:rPr>
+              <a:t>w</a:t>
+            </a:r>
+            <a:r>
+              <a:rPr lang="en-US" altLang="ja-JP" sz="1600" dirty="0" smtClean="0">
+                <a:solidFill>
+                  <a:schemeClr val="tx1">
+                    <a:lumMod val="75000"/>
+                    <a:lumOff val="25000"/>
+                  </a:schemeClr>
+                </a:solidFill>
+              </a:rPr>
+              <a:t>eb-</a:t>
+            </a:r>
+            <a:r>
+              <a:rPr lang="en-US" altLang="ja-JP" sz="1600" dirty="0" err="1" smtClean="0">
+                <a:solidFill>
+                  <a:schemeClr val="tx1">
+                    <a:lumMod val="75000"/>
+                    <a:lumOff val="25000"/>
+                  </a:schemeClr>
+                </a:solidFill>
+              </a:rPr>
+              <a:t>jsp</a:t>
+            </a:r>
+            <a:r>
+              <a:rPr lang="en-US" altLang="ja-JP" sz="1600" dirty="0" smtClean="0">
+                <a:solidFill>
+                  <a:schemeClr val="tx1">
+                    <a:lumMod val="75000"/>
+                    <a:lumOff val="25000"/>
+                  </a:schemeClr>
+                </a:solidFill>
+              </a:rPr>
+              <a:t>-dependencies</a:t>
+            </a:r>
+            <a:endParaRPr kumimoji="1" lang="en-US" altLang="ja-JP" sz="1600" dirty="0" smtClean="0">
+              <a:solidFill>
+                <a:schemeClr val="tx1">
+                  <a:lumMod val="75000"/>
+                  <a:lumOff val="25000"/>
+                </a:schemeClr>
+              </a:solidFill>
+            </a:endParaRPr>
+          </a:p>
+        </p:txBody>
+      </p:sp>
+      <p:sp>
+        <p:nvSpPr>
+          <p:cNvPr id="71" name="角丸四角形 70"/>
+          <p:cNvSpPr/>
+          <p:nvPr/>
+        </p:nvSpPr>
+        <p:spPr>
+          <a:xfrm>
+            <a:off x="5392138" y="3744386"/>
+            <a:ext cx="3353754" cy="368242"/>
+          </a:xfrm>
+          <a:prstGeom prst="roundRect">
+            <a:avLst/>
+          </a:prstGeom>
+          <a:gradFill>
+            <a:gsLst>
+              <a:gs pos="0">
+                <a:schemeClr val="bg1">
+                  <a:lumMod val="75000"/>
+                </a:schemeClr>
+              </a:gs>
+              <a:gs pos="100000">
+                <a:schemeClr val="bg1">
+                  <a:lumMod val="95000"/>
+                </a:schemeClr>
+              </a:gs>
+            </a:gsLst>
+          </a:gradFill>
+        </p:spPr>
+        <p:style>
+          <a:lnRef idx="1">
+            <a:schemeClr val="dk1"/>
+          </a:lnRef>
+          <a:fillRef idx="3">
+            <a:schemeClr val="dk1"/>
+          </a:fillRef>
+          <a:effectRef idx="2">
+            <a:schemeClr val="dk1"/>
+          </a:effectRef>
+          <a:fontRef idx="minor">
+            <a:schemeClr val="lt1"/>
+          </a:fontRef>
+        </p:style>
+        <p:txBody>
+          <a:bodyPr rtlCol="0" anchor="ctr"/>
+          <a:lstStyle/>
+          <a:p>
+            <a:pPr algn="ctr"/>
+            <a:r>
+              <a:rPr lang="en-US" altLang="ja-JP" sz="1600" dirty="0">
+                <a:solidFill>
+                  <a:schemeClr val="tx1">
+                    <a:lumMod val="75000"/>
+                    <a:lumOff val="25000"/>
+                  </a:schemeClr>
+                </a:solidFill>
+              </a:rPr>
+              <a:t>s</a:t>
+            </a:r>
+            <a:r>
+              <a:rPr lang="en-US" altLang="ja-JP" sz="1600" dirty="0" smtClean="0">
+                <a:solidFill>
+                  <a:schemeClr val="tx1">
+                    <a:lumMod val="75000"/>
+                    <a:lumOff val="25000"/>
+                  </a:schemeClr>
+                </a:solidFill>
+              </a:rPr>
+              <a:t>ecurity-web-dependencies</a:t>
+            </a:r>
+            <a:endParaRPr kumimoji="1" lang="en-US" altLang="ja-JP" sz="1600" dirty="0" smtClean="0">
+              <a:solidFill>
+                <a:schemeClr val="tx1">
+                  <a:lumMod val="75000"/>
+                  <a:lumOff val="25000"/>
+                </a:schemeClr>
+              </a:solidFill>
+            </a:endParaRPr>
+          </a:p>
+        </p:txBody>
+      </p:sp>
+      <p:sp>
+        <p:nvSpPr>
+          <p:cNvPr id="72" name="角丸四角形 71"/>
+          <p:cNvSpPr/>
+          <p:nvPr/>
+        </p:nvSpPr>
+        <p:spPr>
+          <a:xfrm>
+            <a:off x="6608" y="-1078512"/>
+            <a:ext cx="9189467" cy="998716"/>
+          </a:xfrm>
+          <a:prstGeom prst="roundRect">
+            <a:avLst/>
+          </a:prstGeom>
+          <a:noFill/>
+          <a:ln>
+            <a:solidFill>
+              <a:schemeClr val="tx1">
+                <a:lumMod val="50000"/>
+                <a:lumOff val="50000"/>
+              </a:schemeClr>
+            </a:solidFill>
+          </a:ln>
+        </p:spPr>
+        <p:style>
+          <a:lnRef idx="2">
+            <a:schemeClr val="accent1"/>
+          </a:lnRef>
+          <a:fillRef idx="1">
+            <a:schemeClr val="lt1"/>
+          </a:fillRef>
+          <a:effectRef idx="0">
+            <a:schemeClr val="accent1"/>
+          </a:effectRef>
+          <a:fontRef idx="minor">
+            <a:schemeClr val="dk1"/>
+          </a:fontRef>
+        </p:style>
+        <p:txBody>
+          <a:bodyPr rtlCol="0" anchor="t"/>
+          <a:lstStyle/>
+          <a:p>
+            <a:pPr algn="ctr"/>
+            <a:endParaRPr kumimoji="1" lang="ja-JP" altLang="en-US" sz="2000" b="1" dirty="0">
+              <a:solidFill>
+                <a:schemeClr val="tx1">
+                  <a:lumMod val="65000"/>
+                  <a:lumOff val="35000"/>
+                </a:schemeClr>
+              </a:solidFill>
+            </a:endParaRPr>
+          </a:p>
+        </p:txBody>
+      </p:sp>
+      <p:cxnSp>
+        <p:nvCxnSpPr>
+          <p:cNvPr id="97" name="直線コネクタ 96"/>
+          <p:cNvCxnSpPr>
+            <a:stCxn id="86" idx="2"/>
+            <a:endCxn id="72" idx="0"/>
+          </p:cNvCxnSpPr>
+          <p:nvPr/>
+        </p:nvCxnSpPr>
+        <p:spPr>
           <a:xfrm flipH="1">
-            <a:off x="1574558" y="1376726"/>
-            <a:ext cx="1530298" cy="1346695"/>
-          </a:xfrm>
-          <a:prstGeom prst="straightConnector1">
+            <a:off x="4601342" y="-1997706"/>
+            <a:ext cx="686" cy="919194"/>
+          </a:xfrm>
+          <a:prstGeom prst="line">
+            <a:avLst/>
+          </a:prstGeom>
+          <a:ln w="12700" cmpd="sng">
+            <a:solidFill>
+              <a:schemeClr val="tx1">
+                <a:lumMod val="50000"/>
+                <a:lumOff val="50000"/>
+              </a:schemeClr>
+            </a:solidFill>
+            <a:prstDash val="solid"/>
+            <a:headEnd type="none"/>
+            <a:tailEnd type="none"/>
+          </a:ln>
+        </p:spPr>
+        <p:style>
+          <a:lnRef idx="2">
+            <a:schemeClr val="accent1"/>
+          </a:lnRef>
+          <a:fillRef idx="0">
+            <a:schemeClr val="accent1"/>
+          </a:fillRef>
+          <a:effectRef idx="1">
+            <a:schemeClr val="accent1"/>
+          </a:effectRef>
+          <a:fontRef idx="minor">
+            <a:schemeClr val="tx1"/>
+          </a:fontRef>
+        </p:style>
+      </p:cxnSp>
+      <p:sp>
+        <p:nvSpPr>
+          <p:cNvPr id="109" name="角丸四角形 108"/>
+          <p:cNvSpPr/>
+          <p:nvPr/>
+        </p:nvSpPr>
+        <p:spPr>
+          <a:xfrm>
+            <a:off x="6609" y="880613"/>
+            <a:ext cx="4176141" cy="6840988"/>
+          </a:xfrm>
+          <a:prstGeom prst="roundRect">
+            <a:avLst>
+              <a:gd name="adj" fmla="val 4846"/>
+            </a:avLst>
+          </a:prstGeom>
+          <a:noFill/>
+          <a:ln>
+            <a:solidFill>
+              <a:schemeClr val="tx1">
+                <a:lumMod val="50000"/>
+                <a:lumOff val="50000"/>
+              </a:schemeClr>
+            </a:solidFill>
+          </a:ln>
+        </p:spPr>
+        <p:style>
+          <a:lnRef idx="2">
+            <a:schemeClr val="accent1"/>
+          </a:lnRef>
+          <a:fillRef idx="1">
+            <a:schemeClr val="lt1"/>
+          </a:fillRef>
+          <a:effectRef idx="0">
+            <a:schemeClr val="accent1"/>
+          </a:effectRef>
+          <a:fontRef idx="minor">
+            <a:schemeClr val="dk1"/>
+          </a:fontRef>
+        </p:style>
+        <p:txBody>
+          <a:bodyPr rtlCol="0" anchor="t"/>
+          <a:lstStyle/>
+          <a:p>
+            <a:pPr algn="ctr"/>
+            <a:endParaRPr kumimoji="1" lang="ja-JP" altLang="en-US" sz="2000" b="1" dirty="0">
+              <a:solidFill>
+                <a:schemeClr val="tx1">
+                  <a:lumMod val="65000"/>
+                  <a:lumOff val="35000"/>
+                </a:schemeClr>
+              </a:solidFill>
+            </a:endParaRPr>
+          </a:p>
+        </p:txBody>
+      </p:sp>
+      <p:sp>
+        <p:nvSpPr>
+          <p:cNvPr id="110" name="角丸四角形 109"/>
+          <p:cNvSpPr/>
+          <p:nvPr/>
+        </p:nvSpPr>
+        <p:spPr>
+          <a:xfrm>
+            <a:off x="4995445" y="880613"/>
+            <a:ext cx="4200631" cy="6840988"/>
+          </a:xfrm>
+          <a:prstGeom prst="roundRect">
+            <a:avLst>
+              <a:gd name="adj" fmla="val 4846"/>
+            </a:avLst>
+          </a:prstGeom>
+          <a:noFill/>
+          <a:ln>
+            <a:solidFill>
+              <a:schemeClr val="tx1">
+                <a:lumMod val="50000"/>
+                <a:lumOff val="50000"/>
+              </a:schemeClr>
+            </a:solidFill>
+          </a:ln>
+        </p:spPr>
+        <p:style>
+          <a:lnRef idx="2">
+            <a:schemeClr val="accent1"/>
+          </a:lnRef>
+          <a:fillRef idx="1">
+            <a:schemeClr val="lt1"/>
+          </a:fillRef>
+          <a:effectRef idx="0">
+            <a:schemeClr val="accent1"/>
+          </a:effectRef>
+          <a:fontRef idx="minor">
+            <a:schemeClr val="dk1"/>
+          </a:fontRef>
+        </p:style>
+        <p:txBody>
+          <a:bodyPr rtlCol="0" anchor="t"/>
+          <a:lstStyle/>
+          <a:p>
+            <a:pPr algn="ctr"/>
+            <a:endParaRPr kumimoji="1" lang="ja-JP" altLang="en-US" sz="2000" b="1" dirty="0">
+              <a:solidFill>
+                <a:schemeClr val="tx1">
+                  <a:lumMod val="65000"/>
+                  <a:lumOff val="35000"/>
+                </a:schemeClr>
+              </a:solidFill>
+            </a:endParaRPr>
+          </a:p>
+        </p:txBody>
+      </p:sp>
+      <p:cxnSp>
+        <p:nvCxnSpPr>
+          <p:cNvPr id="112" name="直線コネクタ 111"/>
+          <p:cNvCxnSpPr>
+            <a:stCxn id="62" idx="2"/>
+            <a:endCxn id="109" idx="0"/>
+          </p:cNvCxnSpPr>
+          <p:nvPr/>
+        </p:nvCxnSpPr>
+        <p:spPr>
+          <a:xfrm flipH="1">
+            <a:off x="2094680" y="-415501"/>
+            <a:ext cx="229" cy="1296114"/>
+          </a:xfrm>
+          <a:prstGeom prst="line">
             <a:avLst/>
           </a:prstGeom>
           <a:ln w="12700" cmpd="sng">
@@ -7876,19 +9028,19 @@
       </p:cxnSp>
       <p:cxnSp>
         <p:nvCxnSpPr>
-          <p:cNvPr id="96" name="直線コネクタ 2"/>
+          <p:cNvPr id="113" name="直線コネクタ 112"/>
           <p:cNvCxnSpPr>
-            <a:stCxn id="52" idx="1"/>
-            <a:endCxn id="56" idx="3"/>
+            <a:stCxn id="63" idx="2"/>
+            <a:endCxn id="110" idx="0"/>
           </p:cNvCxnSpPr>
           <p:nvPr/>
         </p:nvCxnSpPr>
         <p:spPr>
           <a:xfrm flipH="1">
-            <a:off x="1574558" y="2023211"/>
-            <a:ext cx="1530297" cy="700210"/>
-          </a:xfrm>
-          <a:prstGeom prst="straightConnector1">
+            <a:off x="7095761" y="-415501"/>
+            <a:ext cx="1455" cy="1296114"/>
+          </a:xfrm>
+          <a:prstGeom prst="line">
             <a:avLst/>
           </a:prstGeom>
           <a:ln w="12700" cmpd="sng">
@@ -7901,6 +9053,95 @@
             <a:prstDash val="solid"/>
             <a:headEnd type="none"/>
             <a:tailEnd type="none"/>
+          </a:ln>
+        </p:spPr>
+        <p:style>
+          <a:lnRef idx="2">
+            <a:schemeClr val="accent1"/>
+          </a:lnRef>
+          <a:fillRef idx="0">
+            <a:schemeClr val="accent1"/>
+          </a:fillRef>
+          <a:effectRef idx="1">
+            <a:schemeClr val="accent1"/>
+          </a:effectRef>
+          <a:fontRef idx="minor">
+            <a:schemeClr val="tx1"/>
+          </a:fontRef>
+        </p:style>
+      </p:cxnSp>
+      <p:sp>
+        <p:nvSpPr>
+          <p:cNvPr id="117" name="テキスト ボックス 116"/>
+          <p:cNvSpPr txBox="1"/>
+          <p:nvPr/>
+        </p:nvSpPr>
+        <p:spPr>
+          <a:xfrm>
+            <a:off x="6147599" y="42439"/>
+            <a:ext cx="1205409" cy="307777"/>
+          </a:xfrm>
+          <a:prstGeom prst="rect">
+            <a:avLst/>
+          </a:prstGeom>
+          <a:noFill/>
+        </p:spPr>
+        <p:txBody>
+          <a:bodyPr wrap="square" rtlCol="0">
+            <a:spAutoFit/>
+          </a:bodyPr>
+          <a:lstStyle/>
+          <a:p>
+            <a:pPr algn="ctr"/>
+            <a:r>
+              <a:rPr kumimoji="1" lang="en-US" altLang="ja-JP" sz="1400" dirty="0" smtClean="0">
+                <a:solidFill>
+                  <a:schemeClr val="tx1">
+                    <a:lumMod val="50000"/>
+                    <a:lumOff val="50000"/>
+                  </a:schemeClr>
+                </a:solidFill>
+              </a:rPr>
+              <a:t>parent</a:t>
+            </a:r>
+            <a:endParaRPr kumimoji="1" lang="ja-JP" altLang="en-US" sz="1400" dirty="0">
+              <a:solidFill>
+                <a:schemeClr val="tx1">
+                  <a:lumMod val="50000"/>
+                  <a:lumOff val="50000"/>
+                </a:schemeClr>
+              </a:solidFill>
+            </a:endParaRPr>
+          </a:p>
+        </p:txBody>
+      </p:sp>
+      <p:cxnSp>
+        <p:nvCxnSpPr>
+          <p:cNvPr id="126" name="カギ線コネクタ 125"/>
+          <p:cNvCxnSpPr>
+            <a:stCxn id="218" idx="1"/>
+            <a:endCxn id="55" idx="3"/>
+          </p:cNvCxnSpPr>
+          <p:nvPr/>
+        </p:nvCxnSpPr>
+        <p:spPr>
+          <a:xfrm flipH="1">
+            <a:off x="3765355" y="1338437"/>
+            <a:ext cx="1602455" cy="999"/>
+          </a:xfrm>
+          <a:prstGeom prst="straightConnector1">
+            <a:avLst/>
+          </a:prstGeom>
+          <a:ln w="12700" cmpd="sng">
+            <a:solidFill>
+              <a:schemeClr val="tx1">
+                <a:lumMod val="50000"/>
+                <a:lumOff val="50000"/>
+              </a:schemeClr>
+            </a:solidFill>
+            <a:prstDash val="sysDash"/>
+            <a:headEnd type="none"/>
+            <a:tailEnd type="triangle"/>
           </a:ln>
         </p:spPr>
         <p:style>
@@ -7920,17 +9161,17 @@
       </p:cxnSp>
       <p:cxnSp>
         <p:nvCxnSpPr>
-          <p:cNvPr id="99" name="直線コネクタ 2"/>
+          <p:cNvPr id="133" name="カギ線コネクタ 125"/>
           <p:cNvCxnSpPr>
-            <a:stCxn id="53" idx="1"/>
-            <a:endCxn id="56" idx="3"/>
+            <a:stCxn id="215" idx="1"/>
+            <a:endCxn id="52" idx="3"/>
           </p:cNvCxnSpPr>
           <p:nvPr/>
         </p:nvCxnSpPr>
         <p:spPr>
-          <a:xfrm flipH="1">
-            <a:off x="1574558" y="2669696"/>
-            <a:ext cx="1540220" cy="53725"/>
+          <a:xfrm flipH="1" flipV="1">
+            <a:off x="3765354" y="1985921"/>
+            <a:ext cx="1612378" cy="59"/>
           </a:xfrm>
           <a:prstGeom prst="straightConnector1">
             <a:avLst/>
@@ -7942,9 +9183,9 @@
                 <a:lumOff val="50000"/>
               </a:schemeClr>
             </a:solidFill>
-            <a:prstDash val="solid"/>
+            <a:prstDash val="sysDash"/>
             <a:headEnd type="none"/>
-            <a:tailEnd type="none"/>
+            <a:tailEnd type="triangle"/>
           </a:ln>
         </p:spPr>
         <p:style>
@@ -7964,17 +9205,17 @@
       </p:cxnSp>
       <p:cxnSp>
         <p:nvCxnSpPr>
-          <p:cNvPr id="102" name="直線コネクタ 2"/>
+          <p:cNvPr id="136" name="カギ線コネクタ 125"/>
           <p:cNvCxnSpPr>
-            <a:stCxn id="47" idx="1"/>
-            <a:endCxn id="56" idx="3"/>
+            <a:stCxn id="216" idx="1"/>
+            <a:endCxn id="53" idx="3"/>
           </p:cNvCxnSpPr>
           <p:nvPr/>
         </p:nvCxnSpPr>
         <p:spPr>
           <a:xfrm flipH="1" flipV="1">
-            <a:off x="1574558" y="2723421"/>
-            <a:ext cx="1543789" cy="1239245"/>
+            <a:off x="3765354" y="2632406"/>
+            <a:ext cx="1622549" cy="56"/>
           </a:xfrm>
           <a:prstGeom prst="straightConnector1">
             <a:avLst/>
@@ -7986,9 +9227,9 @@
                 <a:lumOff val="50000"/>
               </a:schemeClr>
             </a:solidFill>
-            <a:prstDash val="solid"/>
+            <a:prstDash val="sysDash"/>
             <a:headEnd type="none"/>
-            <a:tailEnd type="none"/>
+            <a:tailEnd type="triangle"/>
           </a:ln>
         </p:spPr>
         <p:style>
@@ -8008,17 +9249,17 @@
       </p:cxnSp>
       <p:cxnSp>
         <p:nvCxnSpPr>
-          <p:cNvPr id="105" name="直線コネクタ 2"/>
+          <p:cNvPr id="140" name="カギ線コネクタ 125"/>
           <p:cNvCxnSpPr>
-            <a:stCxn id="46" idx="1"/>
-            <a:endCxn id="56" idx="3"/>
+            <a:stCxn id="68" idx="1"/>
+            <a:endCxn id="60" idx="3"/>
           </p:cNvCxnSpPr>
           <p:nvPr/>
         </p:nvCxnSpPr>
         <p:spPr>
           <a:xfrm flipH="1" flipV="1">
-            <a:off x="1574558" y="2723421"/>
-            <a:ext cx="1540220" cy="1885730"/>
+            <a:off x="3765354" y="3278891"/>
+            <a:ext cx="1626784" cy="4436"/>
           </a:xfrm>
           <a:prstGeom prst="straightConnector1">
             <a:avLst/>
@@ -8030,9 +9271,9 @@
                 <a:lumOff val="50000"/>
               </a:schemeClr>
             </a:solidFill>
-            <a:prstDash val="solid"/>
+            <a:prstDash val="sysDash"/>
             <a:headEnd type="none"/>
-            <a:tailEnd type="none"/>
+            <a:tailEnd type="triangle"/>
           </a:ln>
         </p:spPr>
         <p:style>
@@ -8052,17 +9293,17 @@
       </p:cxnSp>
       <p:cxnSp>
         <p:nvCxnSpPr>
-          <p:cNvPr id="108" name="直線コネクタ 2"/>
+          <p:cNvPr id="143" name="カギ線コネクタ 125"/>
           <p:cNvCxnSpPr>
-            <a:stCxn id="50" idx="1"/>
-            <a:endCxn id="56" idx="3"/>
+            <a:stCxn id="71" idx="1"/>
+            <a:endCxn id="47" idx="3"/>
           </p:cNvCxnSpPr>
           <p:nvPr/>
         </p:nvCxnSpPr>
         <p:spPr>
           <a:xfrm flipH="1" flipV="1">
-            <a:off x="1574558" y="2723421"/>
-            <a:ext cx="1550142" cy="2532215"/>
+            <a:off x="3755432" y="3925376"/>
+            <a:ext cx="1636706" cy="3131"/>
           </a:xfrm>
           <a:prstGeom prst="straightConnector1">
             <a:avLst/>
@@ -8074,9 +9315,270 @@
                 <a:lumOff val="50000"/>
               </a:schemeClr>
             </a:solidFill>
-            <a:prstDash val="solid"/>
+            <a:prstDash val="sysDash"/>
             <a:headEnd type="none"/>
-            <a:tailEnd type="none"/>
+            <a:tailEnd type="triangle"/>
+          </a:ln>
+        </p:spPr>
+        <p:style>
+          <a:lnRef idx="2">
+            <a:schemeClr val="accent1"/>
+          </a:lnRef>
+          <a:fillRef idx="0">
+            <a:schemeClr val="accent1"/>
+          </a:fillRef>
+          <a:effectRef idx="1">
+            <a:schemeClr val="accent1"/>
+          </a:effectRef>
+          <a:fontRef idx="minor">
+            <a:schemeClr val="tx1"/>
+          </a:fontRef>
+        </p:style>
+      </p:cxnSp>
+      <p:sp>
+        <p:nvSpPr>
+          <p:cNvPr id="146" name="テキスト ボックス 145"/>
+          <p:cNvSpPr txBox="1"/>
+          <p:nvPr/>
+        </p:nvSpPr>
+        <p:spPr>
+          <a:xfrm>
+            <a:off x="4182751" y="1295073"/>
+            <a:ext cx="810851" cy="307777"/>
+          </a:xfrm>
+          <a:prstGeom prst="rect">
+            <a:avLst/>
+          </a:prstGeom>
+          <a:noFill/>
+        </p:spPr>
+        <p:txBody>
+          <a:bodyPr wrap="none" rtlCol="0">
+            <a:spAutoFit/>
+          </a:bodyPr>
+          <a:lstStyle/>
+          <a:p>
+            <a:r>
+              <a:rPr kumimoji="1" lang="en-US" altLang="ja-JP" sz="1400" dirty="0" smtClean="0">
+                <a:solidFill>
+                  <a:schemeClr val="tx1">
+                    <a:lumMod val="50000"/>
+                    <a:lumOff val="50000"/>
+                  </a:schemeClr>
+                </a:solidFill>
+              </a:rPr>
+              <a:t>depends</a:t>
+            </a:r>
+            <a:endParaRPr kumimoji="1" lang="ja-JP" altLang="en-US" sz="1400" dirty="0">
+              <a:solidFill>
+                <a:schemeClr val="tx1">
+                  <a:lumMod val="50000"/>
+                  <a:lumOff val="50000"/>
+                </a:schemeClr>
+              </a:solidFill>
+            </a:endParaRPr>
+          </a:p>
+        </p:txBody>
+      </p:sp>
+      <p:sp>
+        <p:nvSpPr>
+          <p:cNvPr id="157" name="テキスト ボックス 156"/>
+          <p:cNvSpPr txBox="1"/>
+          <p:nvPr/>
+        </p:nvSpPr>
+        <p:spPr>
+          <a:xfrm>
+            <a:off x="4182751" y="1948732"/>
+            <a:ext cx="810851" cy="307777"/>
+          </a:xfrm>
+          <a:prstGeom prst="rect">
+            <a:avLst/>
+          </a:prstGeom>
+          <a:noFill/>
+        </p:spPr>
+        <p:txBody>
+          <a:bodyPr wrap="none" rtlCol="0">
+            <a:spAutoFit/>
+          </a:bodyPr>
+          <a:lstStyle/>
+          <a:p>
+            <a:r>
+              <a:rPr kumimoji="1" lang="en-US" altLang="ja-JP" sz="1400" dirty="0" smtClean="0">
+                <a:solidFill>
+                  <a:schemeClr val="tx1">
+                    <a:lumMod val="50000"/>
+                    <a:lumOff val="50000"/>
+                  </a:schemeClr>
+                </a:solidFill>
+              </a:rPr>
+              <a:t>depends</a:t>
+            </a:r>
+            <a:endParaRPr kumimoji="1" lang="ja-JP" altLang="en-US" sz="1400" dirty="0">
+              <a:solidFill>
+                <a:schemeClr val="tx1">
+                  <a:lumMod val="50000"/>
+                  <a:lumOff val="50000"/>
+                </a:schemeClr>
+              </a:solidFill>
+            </a:endParaRPr>
+          </a:p>
+        </p:txBody>
+      </p:sp>
+      <p:sp>
+        <p:nvSpPr>
+          <p:cNvPr id="158" name="テキスト ボックス 157"/>
+          <p:cNvSpPr txBox="1"/>
+          <p:nvPr/>
+        </p:nvSpPr>
+        <p:spPr>
+          <a:xfrm>
+            <a:off x="4182751" y="2588762"/>
+            <a:ext cx="810851" cy="307777"/>
+          </a:xfrm>
+          <a:prstGeom prst="rect">
+            <a:avLst/>
+          </a:prstGeom>
+          <a:noFill/>
+        </p:spPr>
+        <p:txBody>
+          <a:bodyPr wrap="none" rtlCol="0">
+            <a:spAutoFit/>
+          </a:bodyPr>
+          <a:lstStyle/>
+          <a:p>
+            <a:r>
+              <a:rPr kumimoji="1" lang="en-US" altLang="ja-JP" sz="1400" dirty="0" smtClean="0">
+                <a:solidFill>
+                  <a:schemeClr val="tx1">
+                    <a:lumMod val="50000"/>
+                    <a:lumOff val="50000"/>
+                  </a:schemeClr>
+                </a:solidFill>
+              </a:rPr>
+              <a:t>depends</a:t>
+            </a:r>
+            <a:endParaRPr kumimoji="1" lang="ja-JP" altLang="en-US" sz="1400" dirty="0">
+              <a:solidFill>
+                <a:schemeClr val="tx1">
+                  <a:lumMod val="50000"/>
+                  <a:lumOff val="50000"/>
+                </a:schemeClr>
+              </a:solidFill>
+            </a:endParaRPr>
+          </a:p>
+        </p:txBody>
+      </p:sp>
+      <p:sp>
+        <p:nvSpPr>
+          <p:cNvPr id="159" name="テキスト ボックス 158"/>
+          <p:cNvSpPr txBox="1"/>
+          <p:nvPr/>
+        </p:nvSpPr>
+        <p:spPr>
+          <a:xfrm>
+            <a:off x="4182751" y="3267619"/>
+            <a:ext cx="810851" cy="307777"/>
+          </a:xfrm>
+          <a:prstGeom prst="rect">
+            <a:avLst/>
+          </a:prstGeom>
+          <a:noFill/>
+        </p:spPr>
+        <p:txBody>
+          <a:bodyPr wrap="none" rtlCol="0">
+            <a:spAutoFit/>
+          </a:bodyPr>
+          <a:lstStyle/>
+          <a:p>
+            <a:r>
+              <a:rPr kumimoji="1" lang="en-US" altLang="ja-JP" sz="1400" dirty="0" smtClean="0">
+                <a:solidFill>
+                  <a:schemeClr val="tx1">
+                    <a:lumMod val="50000"/>
+                    <a:lumOff val="50000"/>
+                  </a:schemeClr>
+                </a:solidFill>
+              </a:rPr>
+              <a:t>depends</a:t>
+            </a:r>
+            <a:endParaRPr kumimoji="1" lang="ja-JP" altLang="en-US" sz="1400" dirty="0">
+              <a:solidFill>
+                <a:schemeClr val="tx1">
+                  <a:lumMod val="50000"/>
+                  <a:lumOff val="50000"/>
+                </a:schemeClr>
+              </a:solidFill>
+            </a:endParaRPr>
+          </a:p>
+        </p:txBody>
+      </p:sp>
+      <p:sp>
+        <p:nvSpPr>
+          <p:cNvPr id="160" name="テキスト ボックス 159"/>
+          <p:cNvSpPr txBox="1"/>
+          <p:nvPr/>
+        </p:nvSpPr>
+        <p:spPr>
+          <a:xfrm>
+            <a:off x="4182751" y="3942892"/>
+            <a:ext cx="810851" cy="307777"/>
+          </a:xfrm>
+          <a:prstGeom prst="rect">
+            <a:avLst/>
+          </a:prstGeom>
+          <a:noFill/>
+        </p:spPr>
+        <p:txBody>
+          <a:bodyPr wrap="none" rtlCol="0">
+            <a:spAutoFit/>
+          </a:bodyPr>
+          <a:lstStyle/>
+          <a:p>
+            <a:r>
+              <a:rPr kumimoji="1" lang="en-US" altLang="ja-JP" sz="1400" dirty="0" smtClean="0">
+                <a:solidFill>
+                  <a:schemeClr val="tx1">
+                    <a:lumMod val="50000"/>
+                    <a:lumOff val="50000"/>
+                  </a:schemeClr>
+                </a:solidFill>
+              </a:rPr>
+              <a:t>depends</a:t>
+            </a:r>
+            <a:endParaRPr kumimoji="1" lang="ja-JP" altLang="en-US" sz="1400" dirty="0">
+              <a:solidFill>
+                <a:schemeClr val="tx1">
+                  <a:lumMod val="50000"/>
+                  <a:lumOff val="50000"/>
+                </a:schemeClr>
+              </a:solidFill>
+            </a:endParaRPr>
+          </a:p>
+        </p:txBody>
+      </p:sp>
+      <p:cxnSp>
+        <p:nvCxnSpPr>
+          <p:cNvPr id="164" name="直線コネクタ 2"/>
+          <p:cNvCxnSpPr/>
+          <p:nvPr/>
+        </p:nvCxnSpPr>
+        <p:spPr>
+          <a:xfrm flipH="1">
+            <a:off x="7059094" y="1523557"/>
+            <a:ext cx="1" cy="278243"/>
+          </a:xfrm>
+          <a:prstGeom prst="straightConnector1">
+            <a:avLst/>
+          </a:prstGeom>
+          <a:ln w="12700" cmpd="sng">
+            <a:solidFill>
+              <a:schemeClr val="tx1">
+                <a:lumMod val="50000"/>
+                <a:lumOff val="50000"/>
+              </a:schemeClr>
+            </a:solidFill>
+            <a:prstDash val="sysDash"/>
+            <a:headEnd type="none"/>
+            <a:tailEnd type="arrow"/>
           </a:ln>
         </p:spPr>
         <p:style>
@@ -8096,17 +9598,14 @@
       </p:cxnSp>
       <p:cxnSp>
         <p:nvCxnSpPr>
-          <p:cNvPr id="111" name="直線コネクタ 2"/>
-          <p:cNvCxnSpPr>
-            <a:stCxn id="51" idx="1"/>
-            <a:endCxn id="56" idx="3"/>
-          </p:cNvCxnSpPr>
+          <p:cNvPr id="165" name="直線コネクタ 2"/>
+          <p:cNvCxnSpPr/>
           <p:nvPr/>
         </p:nvCxnSpPr>
         <p:spPr>
           <a:xfrm flipH="1" flipV="1">
-            <a:off x="1574558" y="2723421"/>
-            <a:ext cx="1563633" cy="3178700"/>
+            <a:off x="7059094" y="2170042"/>
+            <a:ext cx="4962" cy="278243"/>
           </a:xfrm>
           <a:prstGeom prst="straightConnector1">
             <a:avLst/>
@@ -8118,9 +9617,9 @@
                 <a:lumOff val="50000"/>
               </a:schemeClr>
             </a:solidFill>
-            <a:prstDash val="solid"/>
+            <a:prstDash val="sysDash"/>
             <a:headEnd type="none"/>
-            <a:tailEnd type="none"/>
+            <a:tailEnd type="arrow"/>
           </a:ln>
         </p:spPr>
         <p:style>
@@ -8138,22 +9637,112 @@
           </a:fontRef>
         </p:style>
       </p:cxnSp>
+      <p:sp>
+        <p:nvSpPr>
+          <p:cNvPr id="166" name="テキスト ボックス 165"/>
+          <p:cNvSpPr txBox="1"/>
+          <p:nvPr/>
+        </p:nvSpPr>
+        <p:spPr>
+          <a:xfrm>
+            <a:off x="7158315" y="1505662"/>
+            <a:ext cx="810851" cy="307777"/>
+          </a:xfrm>
+          <a:prstGeom prst="rect">
+            <a:avLst/>
+          </a:prstGeom>
+          <a:noFill/>
+        </p:spPr>
+        <p:txBody>
+          <a:bodyPr wrap="none" rtlCol="0">
+            <a:spAutoFit/>
+          </a:bodyPr>
+          <a:lstStyle/>
+          <a:p>
+            <a:r>
+              <a:rPr kumimoji="1" lang="en-US" altLang="ja-JP" sz="1400" dirty="0" smtClean="0">
+                <a:solidFill>
+                  <a:schemeClr val="tx1">
+                    <a:lumMod val="50000"/>
+                    <a:lumOff val="50000"/>
+                  </a:schemeClr>
+                </a:solidFill>
+              </a:rPr>
+              <a:t>depends</a:t>
+            </a:r>
+            <a:endParaRPr kumimoji="1" lang="ja-JP" altLang="en-US" sz="1400" dirty="0">
+              <a:solidFill>
+                <a:schemeClr val="tx1">
+                  <a:lumMod val="50000"/>
+                  <a:lumOff val="50000"/>
+                </a:schemeClr>
+              </a:solidFill>
+            </a:endParaRPr>
+          </a:p>
+        </p:txBody>
+      </p:sp>
+      <p:sp>
+        <p:nvSpPr>
+          <p:cNvPr id="167" name="テキスト ボックス 166"/>
+          <p:cNvSpPr txBox="1"/>
+          <p:nvPr/>
+        </p:nvSpPr>
+        <p:spPr>
+          <a:xfrm>
+            <a:off x="7158523" y="2151984"/>
+            <a:ext cx="810851" cy="307777"/>
+          </a:xfrm>
+          <a:prstGeom prst="rect">
+            <a:avLst/>
+          </a:prstGeom>
+          <a:noFill/>
+        </p:spPr>
+        <p:txBody>
+          <a:bodyPr wrap="none" rtlCol="0">
+            <a:spAutoFit/>
+          </a:bodyPr>
+          <a:lstStyle/>
+          <a:p>
+            <a:r>
+              <a:rPr kumimoji="1" lang="en-US" altLang="ja-JP" sz="1400" dirty="0" smtClean="0">
+                <a:solidFill>
+                  <a:schemeClr val="tx1">
+                    <a:lumMod val="50000"/>
+                    <a:lumOff val="50000"/>
+                  </a:schemeClr>
+                </a:solidFill>
+              </a:rPr>
+              <a:t>depends</a:t>
+            </a:r>
+            <a:endParaRPr kumimoji="1" lang="ja-JP" altLang="en-US" sz="1400" dirty="0">
+              <a:solidFill>
+                <a:schemeClr val="tx1">
+                  <a:lumMod val="50000"/>
+                  <a:lumOff val="50000"/>
+                </a:schemeClr>
+              </a:solidFill>
+            </a:endParaRPr>
+          </a:p>
+        </p:txBody>
+      </p:sp>
       <p:cxnSp>
         <p:nvCxnSpPr>
-          <p:cNvPr id="115" name="直線コネクタ 2"/>
+          <p:cNvPr id="170" name="カギ線コネクタ 169"/>
           <p:cNvCxnSpPr>
-            <a:stCxn id="48" idx="1"/>
-            <a:endCxn id="56" idx="3"/>
+            <a:stCxn id="68" idx="3"/>
+            <a:endCxn id="215" idx="3"/>
           </p:cNvCxnSpPr>
           <p:nvPr/>
         </p:nvCxnSpPr>
         <p:spPr>
           <a:xfrm flipH="1" flipV="1">
-            <a:off x="1574558" y="2723421"/>
-            <a:ext cx="1573555" cy="3825185"/>
-          </a:xfrm>
-          <a:prstGeom prst="straightConnector1">
-            <a:avLst/>
+            <a:off x="8741657" y="1985980"/>
+            <a:ext cx="4235" cy="1297347"/>
+          </a:xfrm>
+          <a:prstGeom prst="bentConnector3">
+            <a:avLst>
+              <a:gd name="adj1" fmla="val -5397875"/>
+            </a:avLst>
           </a:prstGeom>
           <a:ln w="12700" cmpd="sng">
             <a:solidFill>
@@ -8162,9 +9751,9 @@
                 <a:lumOff val="50000"/>
               </a:schemeClr>
             </a:solidFill>
-            <a:prstDash val="solid"/>
+            <a:prstDash val="sysDash"/>
             <a:headEnd type="none"/>
-            <a:tailEnd type="none"/>
+            <a:tailEnd type="triangle"/>
           </a:ln>
         </p:spPr>
         <p:style>
@@ -8182,937 +9771,15 @@
           </a:fontRef>
         </p:style>
       </p:cxnSp>
-      <p:cxnSp>
-        <p:nvCxnSpPr>
-          <p:cNvPr id="118" name="直線コネクタ 2"/>
-          <p:cNvCxnSpPr>
-            <a:stCxn id="49" idx="1"/>
-            <a:endCxn id="56" idx="3"/>
-          </p:cNvCxnSpPr>
-          <p:nvPr/>
-        </p:nvCxnSpPr>
-        <p:spPr>
-          <a:xfrm flipH="1" flipV="1">
-            <a:off x="1574558" y="2723421"/>
-            <a:ext cx="1583726" cy="4471667"/>
-          </a:xfrm>
-          <a:prstGeom prst="straightConnector1">
-            <a:avLst/>
-          </a:prstGeom>
-          <a:ln w="12700" cmpd="sng">
-            <a:solidFill>
-              <a:schemeClr val="tx1">
-                <a:lumMod val="50000"/>
-                <a:lumOff val="50000"/>
-              </a:schemeClr>
-            </a:solidFill>
-            <a:prstDash val="solid"/>
-            <a:headEnd type="none"/>
-            <a:tailEnd type="none"/>
-          </a:ln>
-        </p:spPr>
-        <p:style>
-          <a:lnRef idx="2">
-            <a:schemeClr val="accent1"/>
-          </a:lnRef>
-          <a:fillRef idx="0">
-            <a:schemeClr val="accent1"/>
-          </a:fillRef>
-          <a:effectRef idx="1">
-            <a:schemeClr val="accent1"/>
-          </a:effectRef>
-          <a:fontRef idx="minor">
-            <a:schemeClr val="tx1"/>
-          </a:fontRef>
-        </p:style>
-      </p:cxnSp>
-      <p:sp>
-        <p:nvSpPr>
-          <p:cNvPr id="121" name="テキスト ボックス 120"/>
+      <p:sp>
+        <p:nvSpPr>
+          <p:cNvPr id="171" name="テキスト ボックス 170"/>
           <p:cNvSpPr txBox="1"/>
           <p:nvPr/>
         </p:nvSpPr>
         <p:spPr>
           <a:xfrm>
-            <a:off x="2273194" y="2374446"/>
-            <a:ext cx="671378" cy="307777"/>
-          </a:xfrm>
-          <a:prstGeom prst="rect">
-            <a:avLst/>
-          </a:prstGeom>
-          <a:noFill/>
-        </p:spPr>
-        <p:txBody>
-          <a:bodyPr wrap="none" rtlCol="0">
-            <a:spAutoFit/>
-          </a:bodyPr>
-          <a:lstStyle/>
-          <a:p>
-            <a:r>
-              <a:rPr kumimoji="1" lang="en-US" altLang="ja-JP" sz="1400" dirty="0" smtClean="0">
-                <a:solidFill>
-                  <a:schemeClr val="tx1">
-                    <a:lumMod val="50000"/>
-                    <a:lumOff val="50000"/>
-                  </a:schemeClr>
-                </a:solidFill>
-              </a:rPr>
-              <a:t>parent</a:t>
-            </a:r>
-            <a:endParaRPr kumimoji="1" lang="ja-JP" altLang="en-US" sz="1400" dirty="0">
-              <a:solidFill>
-                <a:schemeClr val="tx1">
-                  <a:lumMod val="50000"/>
-                  <a:lumOff val="50000"/>
-                </a:schemeClr>
-              </a:solidFill>
-            </a:endParaRPr>
-          </a:p>
-        </p:txBody>
-      </p:sp>
-      <p:sp>
-        <p:nvSpPr>
-          <p:cNvPr id="122" name="右中かっこ 121"/>
-          <p:cNvSpPr/>
-          <p:nvPr/>
-        </p:nvSpPr>
-        <p:spPr>
-          <a:xfrm>
-            <a:off x="7351555" y="1269846"/>
-            <a:ext cx="367100" cy="2960224"/>
-          </a:xfrm>
-          <a:prstGeom prst="rightBrace">
-            <a:avLst/>
-          </a:prstGeom>
-          <a:ln>
-            <a:solidFill>
-              <a:srgbClr val="7F7F7F"/>
-            </a:solidFill>
-          </a:ln>
-        </p:spPr>
-        <p:style>
-          <a:lnRef idx="2">
-            <a:schemeClr val="accent1"/>
-          </a:lnRef>
-          <a:fillRef idx="0">
-            <a:schemeClr val="accent1"/>
-          </a:fillRef>
-          <a:effectRef idx="1">
-            <a:schemeClr val="accent1"/>
-          </a:effectRef>
-          <a:fontRef idx="minor">
-            <a:schemeClr val="tx1"/>
-          </a:fontRef>
-        </p:style>
-        <p:txBody>
-          <a:bodyPr rtlCol="0" anchor="ctr"/>
-          <a:lstStyle/>
-          <a:p>
-            <a:pPr algn="ctr"/>
-            <a:endParaRPr kumimoji="1" lang="ja-JP" altLang="en-US"/>
-          </a:p>
-        </p:txBody>
-      </p:sp>
-      <p:sp>
-        <p:nvSpPr>
-          <p:cNvPr id="123" name="右中かっこ 122"/>
-          <p:cNvSpPr/>
-          <p:nvPr/>
-        </p:nvSpPr>
-        <p:spPr>
-          <a:xfrm>
-            <a:off x="7351555" y="4350084"/>
-            <a:ext cx="396864" cy="3013572"/>
-          </a:xfrm>
-          <a:prstGeom prst="rightBrace">
-            <a:avLst>
-              <a:gd name="adj1" fmla="val 0"/>
-              <a:gd name="adj2" fmla="val 50000"/>
-            </a:avLst>
-          </a:prstGeom>
-          <a:ln>
-            <a:solidFill>
-              <a:srgbClr val="7F7F7F"/>
-            </a:solidFill>
-          </a:ln>
-        </p:spPr>
-        <p:style>
-          <a:lnRef idx="2">
-            <a:schemeClr val="accent1"/>
-          </a:lnRef>
-          <a:fillRef idx="0">
-            <a:schemeClr val="accent1"/>
-          </a:fillRef>
-          <a:effectRef idx="1">
-            <a:schemeClr val="accent1"/>
-          </a:effectRef>
-          <a:fontRef idx="minor">
-            <a:schemeClr val="tx1"/>
-          </a:fontRef>
-        </p:style>
-        <p:txBody>
-          <a:bodyPr rtlCol="0" anchor="ctr"/>
-          <a:lstStyle/>
-          <a:p>
-            <a:pPr algn="ctr"/>
-            <a:endParaRPr kumimoji="1" lang="ja-JP" altLang="en-US"/>
-          </a:p>
-        </p:txBody>
-      </p:sp>
-      <p:sp>
-        <p:nvSpPr>
-          <p:cNvPr id="124" name="テキスト ボックス 123"/>
-          <p:cNvSpPr txBox="1"/>
-          <p:nvPr/>
-        </p:nvSpPr>
-        <p:spPr>
-          <a:xfrm>
-            <a:off x="7609513" y="2123256"/>
-            <a:ext cx="1595011" cy="1200329"/>
-          </a:xfrm>
-          <a:prstGeom prst="rect">
-            <a:avLst/>
-          </a:prstGeom>
-          <a:noFill/>
-        </p:spPr>
-        <p:txBody>
-          <a:bodyPr wrap="square" rtlCol="0">
-            <a:spAutoFit/>
-          </a:bodyPr>
-          <a:lstStyle/>
-          <a:p>
-            <a:pPr algn="ctr"/>
-            <a:r>
-              <a:rPr lang="en-US" altLang="ja-JP" dirty="0" smtClean="0">
-                <a:solidFill>
-                  <a:schemeClr val="tx1">
-                    <a:lumMod val="65000"/>
-                    <a:lumOff val="35000"/>
-                  </a:schemeClr>
-                </a:solidFill>
-              </a:rPr>
-              <a:t>Provide</a:t>
-            </a:r>
-            <a:endParaRPr kumimoji="1" lang="en-US" altLang="ja-JP" dirty="0" smtClean="0">
-              <a:solidFill>
-                <a:schemeClr val="tx1">
-                  <a:lumMod val="65000"/>
-                  <a:lumOff val="35000"/>
-                </a:schemeClr>
-              </a:solidFill>
-            </a:endParaRPr>
-          </a:p>
-          <a:p>
-            <a:pPr algn="ctr"/>
-            <a:r>
-              <a:rPr lang="en-US" altLang="ja-JP" dirty="0">
-                <a:solidFill>
-                  <a:schemeClr val="tx1">
-                    <a:lumMod val="65000"/>
-                    <a:lumOff val="35000"/>
-                  </a:schemeClr>
-                </a:solidFill>
-              </a:rPr>
-              <a:t>c</a:t>
-            </a:r>
-            <a:r>
-              <a:rPr kumimoji="1" lang="en-US" altLang="ja-JP" dirty="0" smtClean="0">
-                <a:solidFill>
-                  <a:schemeClr val="tx1">
-                    <a:lumMod val="65000"/>
-                    <a:lumOff val="35000"/>
-                  </a:schemeClr>
-                </a:solidFill>
-              </a:rPr>
-              <a:t>lasses</a:t>
-            </a:r>
-          </a:p>
-          <a:p>
-            <a:pPr algn="ctr"/>
-            <a:r>
-              <a:rPr kumimoji="1" lang="en-US" altLang="ja-JP" dirty="0" smtClean="0">
-                <a:solidFill>
-                  <a:schemeClr val="tx1">
-                    <a:lumMod val="65000"/>
-                    <a:lumOff val="35000"/>
-                  </a:schemeClr>
-                </a:solidFill>
-              </a:rPr>
-              <a:t>&amp;</a:t>
-            </a:r>
-          </a:p>
-          <a:p>
-            <a:pPr algn="ctr"/>
-            <a:r>
-              <a:rPr lang="en-US" altLang="ja-JP" dirty="0" smtClean="0">
-                <a:solidFill>
-                  <a:schemeClr val="tx1">
-                    <a:lumMod val="65000"/>
-                    <a:lumOff val="35000"/>
-                  </a:schemeClr>
-                </a:solidFill>
-              </a:rPr>
-              <a:t>dependencies</a:t>
-            </a:r>
-            <a:endParaRPr kumimoji="1" lang="ja-JP" altLang="en-US" dirty="0">
-              <a:solidFill>
-                <a:schemeClr val="tx1">
-                  <a:lumMod val="65000"/>
-                  <a:lumOff val="35000"/>
-                </a:schemeClr>
-              </a:solidFill>
-            </a:endParaRPr>
-          </a:p>
-        </p:txBody>
-      </p:sp>
-      <p:sp>
-        <p:nvSpPr>
-          <p:cNvPr id="125" name="テキスト ボックス 124"/>
-          <p:cNvSpPr txBox="1"/>
-          <p:nvPr/>
-        </p:nvSpPr>
-        <p:spPr>
-          <a:xfrm>
-            <a:off x="7711808" y="5538971"/>
-            <a:ext cx="1492716" cy="646331"/>
-          </a:xfrm>
-          <a:prstGeom prst="rect">
-            <a:avLst/>
-          </a:prstGeom>
-          <a:noFill/>
-        </p:spPr>
-        <p:txBody>
-          <a:bodyPr wrap="none" rtlCol="0">
-            <a:spAutoFit/>
-          </a:bodyPr>
-          <a:lstStyle/>
-          <a:p>
-            <a:pPr algn="ctr"/>
-            <a:r>
-              <a:rPr lang="en-US" altLang="ja-JP" dirty="0" smtClean="0">
-                <a:solidFill>
-                  <a:schemeClr val="tx1">
-                    <a:lumMod val="65000"/>
-                    <a:lumOff val="35000"/>
-                  </a:schemeClr>
-                </a:solidFill>
-              </a:rPr>
-              <a:t>Provide</a:t>
-            </a:r>
-          </a:p>
-          <a:p>
-            <a:pPr algn="ctr"/>
-            <a:r>
-              <a:rPr lang="en-US" altLang="ja-JP" dirty="0">
-                <a:solidFill>
-                  <a:schemeClr val="tx1">
-                    <a:lumMod val="65000"/>
-                    <a:lumOff val="35000"/>
-                  </a:schemeClr>
-                </a:solidFill>
-              </a:rPr>
-              <a:t>d</a:t>
-            </a:r>
-            <a:r>
-              <a:rPr lang="en-US" altLang="ja-JP" dirty="0" smtClean="0">
-                <a:solidFill>
-                  <a:schemeClr val="tx1">
-                    <a:lumMod val="65000"/>
-                    <a:lumOff val="35000"/>
-                  </a:schemeClr>
-                </a:solidFill>
-              </a:rPr>
-              <a:t>ependencies</a:t>
-            </a:r>
-            <a:endParaRPr kumimoji="1" lang="ja-JP" altLang="en-US" dirty="0">
-              <a:solidFill>
-                <a:schemeClr val="tx1">
-                  <a:lumMod val="65000"/>
-                  <a:lumOff val="35000"/>
-                </a:schemeClr>
-              </a:solidFill>
-            </a:endParaRPr>
-          </a:p>
-        </p:txBody>
-      </p:sp>
-      <p:sp>
-        <p:nvSpPr>
-          <p:cNvPr id="34" name="角丸四角形 33"/>
-          <p:cNvSpPr/>
-          <p:nvPr/>
-        </p:nvSpPr>
-        <p:spPr>
-          <a:xfrm>
-            <a:off x="3094933" y="-100365"/>
-            <a:ext cx="3387338" cy="368242"/>
-          </a:xfrm>
-          <a:prstGeom prst="roundRect">
-            <a:avLst/>
-          </a:prstGeom>
-          <a:gradFill>
-            <a:gsLst>
-              <a:gs pos="0">
-                <a:schemeClr val="bg1">
-                  <a:lumMod val="75000"/>
-                </a:schemeClr>
-              </a:gs>
-              <a:gs pos="100000">
-                <a:schemeClr val="bg1">
-                  <a:lumMod val="95000"/>
-                </a:schemeClr>
-              </a:gs>
-            </a:gsLst>
-          </a:gradFill>
-        </p:spPr>
-        <p:style>
-          <a:lnRef idx="1">
-            <a:schemeClr val="dk1"/>
-          </a:lnRef>
-          <a:fillRef idx="3">
-            <a:schemeClr val="dk1"/>
-          </a:fillRef>
-          <a:effectRef idx="2">
-            <a:schemeClr val="dk1"/>
-          </a:effectRef>
-          <a:fontRef idx="minor">
-            <a:schemeClr val="lt1"/>
-          </a:fontRef>
-        </p:style>
-        <p:txBody>
-          <a:bodyPr rtlCol="0" anchor="ctr"/>
-          <a:lstStyle/>
-          <a:p>
-            <a:pPr algn="ctr"/>
-            <a:r>
-              <a:rPr lang="en-US" altLang="ja-JP" sz="1600" dirty="0" err="1" smtClean="0">
-                <a:solidFill>
-                  <a:schemeClr val="tx1">
-                    <a:lumMod val="75000"/>
-                    <a:lumOff val="25000"/>
-                  </a:schemeClr>
-                </a:solidFill>
-              </a:rPr>
-              <a:t>codepoints</a:t>
-            </a:r>
-            <a:endParaRPr kumimoji="1" lang="en-US" altLang="ja-JP" sz="1600" dirty="0" smtClean="0">
-              <a:solidFill>
-                <a:schemeClr val="tx1">
-                  <a:lumMod val="75000"/>
-                  <a:lumOff val="25000"/>
-                </a:schemeClr>
-              </a:solidFill>
-            </a:endParaRPr>
-          </a:p>
-        </p:txBody>
-      </p:sp>
-      <p:sp>
-        <p:nvSpPr>
-          <p:cNvPr id="35" name="角丸四角形 34"/>
-          <p:cNvSpPr/>
-          <p:nvPr/>
-        </p:nvSpPr>
-        <p:spPr>
-          <a:xfrm>
-            <a:off x="3094933" y="-746850"/>
-            <a:ext cx="3387338" cy="368242"/>
-          </a:xfrm>
-          <a:prstGeom prst="roundRect">
-            <a:avLst/>
-          </a:prstGeom>
-          <a:gradFill>
-            <a:gsLst>
-              <a:gs pos="0">
-                <a:schemeClr val="bg1">
-                  <a:lumMod val="75000"/>
-                </a:schemeClr>
-              </a:gs>
-              <a:gs pos="100000">
-                <a:schemeClr val="bg1">
-                  <a:lumMod val="95000"/>
-                </a:schemeClr>
-              </a:gs>
-            </a:gsLst>
-          </a:gradFill>
-        </p:spPr>
-        <p:style>
-          <a:lnRef idx="1">
-            <a:schemeClr val="dk1"/>
-          </a:lnRef>
-          <a:fillRef idx="3">
-            <a:schemeClr val="dk1"/>
-          </a:fillRef>
-          <a:effectRef idx="2">
-            <a:schemeClr val="dk1"/>
-          </a:effectRef>
-          <a:fontRef idx="minor">
-            <a:schemeClr val="lt1"/>
-          </a:fontRef>
-        </p:style>
-        <p:txBody>
-          <a:bodyPr rtlCol="0" anchor="ctr"/>
-          <a:lstStyle/>
-          <a:p>
-            <a:pPr algn="ctr"/>
-            <a:r>
-              <a:rPr kumimoji="1" lang="en-US" altLang="ja-JP" sz="1600" dirty="0" smtClean="0">
-                <a:solidFill>
-                  <a:schemeClr val="tx1">
-                    <a:lumMod val="75000"/>
-                    <a:lumOff val="25000"/>
-                  </a:schemeClr>
-                </a:solidFill>
-              </a:rPr>
-              <a:t>string</a:t>
-            </a:r>
-          </a:p>
-        </p:txBody>
-      </p:sp>
-      <p:sp>
-        <p:nvSpPr>
-          <p:cNvPr id="36" name="角丸四角形 35"/>
-          <p:cNvSpPr/>
-          <p:nvPr/>
-        </p:nvSpPr>
-        <p:spPr>
-          <a:xfrm>
-            <a:off x="3094933" y="546120"/>
-            <a:ext cx="3387338" cy="368242"/>
-          </a:xfrm>
-          <a:prstGeom prst="roundRect">
-            <a:avLst/>
-          </a:prstGeom>
-          <a:gradFill>
-            <a:gsLst>
-              <a:gs pos="0">
-                <a:schemeClr val="bg1">
-                  <a:lumMod val="75000"/>
-                </a:schemeClr>
-              </a:gs>
-              <a:gs pos="100000">
-                <a:schemeClr val="bg1">
-                  <a:lumMod val="95000"/>
-                </a:schemeClr>
-              </a:gs>
-            </a:gsLst>
-          </a:gradFill>
-        </p:spPr>
-        <p:style>
-          <a:lnRef idx="1">
-            <a:schemeClr val="dk1"/>
-          </a:lnRef>
-          <a:fillRef idx="3">
-            <a:schemeClr val="dk1"/>
-          </a:fillRef>
-          <a:effectRef idx="2">
-            <a:schemeClr val="dk1"/>
-          </a:effectRef>
-          <a:fontRef idx="minor">
-            <a:schemeClr val="lt1"/>
-          </a:fontRef>
-        </p:style>
-        <p:txBody>
-          <a:bodyPr rtlCol="0" anchor="ctr"/>
-          <a:lstStyle/>
-          <a:p>
-            <a:pPr algn="ctr"/>
-            <a:r>
-              <a:rPr lang="en-US" altLang="ja-JP" sz="1600" dirty="0" smtClean="0">
-                <a:solidFill>
-                  <a:schemeClr val="tx1">
-                    <a:lumMod val="75000"/>
-                    <a:lumOff val="25000"/>
-                  </a:schemeClr>
-                </a:solidFill>
-              </a:rPr>
-              <a:t>validator</a:t>
-            </a:r>
-            <a:endParaRPr kumimoji="1" lang="en-US" altLang="ja-JP" sz="1600" dirty="0" smtClean="0">
-              <a:solidFill>
-                <a:schemeClr val="tx1">
-                  <a:lumMod val="75000"/>
-                  <a:lumOff val="25000"/>
-                </a:schemeClr>
-              </a:solidFill>
-            </a:endParaRPr>
-          </a:p>
-        </p:txBody>
-      </p:sp>
-      <p:cxnSp>
-        <p:nvCxnSpPr>
-          <p:cNvPr id="58" name="直線コネクタ 2"/>
-          <p:cNvCxnSpPr>
-            <a:stCxn id="36" idx="1"/>
-            <a:endCxn id="56" idx="3"/>
-          </p:cNvCxnSpPr>
-          <p:nvPr/>
-        </p:nvCxnSpPr>
-        <p:spPr>
-          <a:xfrm flipH="1">
-            <a:off x="1574558" y="730241"/>
-            <a:ext cx="1520375" cy="1993180"/>
-          </a:xfrm>
-          <a:prstGeom prst="straightConnector1">
-            <a:avLst/>
-          </a:prstGeom>
-          <a:ln w="12700" cmpd="sng">
-            <a:solidFill>
-              <a:schemeClr val="tx1">
-                <a:lumMod val="50000"/>
-                <a:lumOff val="50000"/>
-              </a:schemeClr>
-            </a:solidFill>
-            <a:prstDash val="solid"/>
-            <a:headEnd type="none"/>
-            <a:tailEnd type="none"/>
-          </a:ln>
-        </p:spPr>
-        <p:style>
-          <a:lnRef idx="2">
-            <a:schemeClr val="accent1"/>
-          </a:lnRef>
-          <a:fillRef idx="0">
-            <a:schemeClr val="accent1"/>
-          </a:fillRef>
-          <a:effectRef idx="1">
-            <a:schemeClr val="accent1"/>
-          </a:effectRef>
-          <a:fontRef idx="minor">
-            <a:schemeClr val="tx1"/>
-          </a:fontRef>
-        </p:style>
-      </p:cxnSp>
-      <p:cxnSp>
-        <p:nvCxnSpPr>
-          <p:cNvPr id="59" name="直線コネクタ 2"/>
-          <p:cNvCxnSpPr>
-            <a:stCxn id="34" idx="1"/>
-            <a:endCxn id="56" idx="3"/>
-          </p:cNvCxnSpPr>
-          <p:nvPr/>
-        </p:nvCxnSpPr>
-        <p:spPr>
-          <a:xfrm flipH="1">
-            <a:off x="1574558" y="83756"/>
-            <a:ext cx="1520375" cy="2639665"/>
-          </a:xfrm>
-          <a:prstGeom prst="straightConnector1">
-            <a:avLst/>
-          </a:prstGeom>
-          <a:ln w="12700" cmpd="sng">
-            <a:solidFill>
-              <a:schemeClr val="tx1">
-                <a:lumMod val="50000"/>
-                <a:lumOff val="50000"/>
-              </a:schemeClr>
-            </a:solidFill>
-            <a:prstDash val="solid"/>
-            <a:headEnd type="none"/>
-            <a:tailEnd type="none"/>
-          </a:ln>
-        </p:spPr>
-        <p:style>
-          <a:lnRef idx="2">
-            <a:schemeClr val="accent1"/>
-          </a:lnRef>
-          <a:fillRef idx="0">
-            <a:schemeClr val="accent1"/>
-          </a:fillRef>
-          <a:effectRef idx="1">
-            <a:schemeClr val="accent1"/>
-          </a:effectRef>
-          <a:fontRef idx="minor">
-            <a:schemeClr val="tx1"/>
-          </a:fontRef>
-        </p:style>
-      </p:cxnSp>
-      <p:cxnSp>
-        <p:nvCxnSpPr>
-          <p:cNvPr id="61" name="直線コネクタ 2"/>
-          <p:cNvCxnSpPr>
-            <a:stCxn id="35" idx="1"/>
-            <a:endCxn id="56" idx="3"/>
-          </p:cNvCxnSpPr>
-          <p:nvPr/>
-        </p:nvCxnSpPr>
-        <p:spPr>
-          <a:xfrm flipH="1">
-            <a:off x="1574558" y="-562729"/>
-            <a:ext cx="1520375" cy="3286150"/>
-          </a:xfrm>
-          <a:prstGeom prst="straightConnector1">
-            <a:avLst/>
-          </a:prstGeom>
-          <a:ln w="12700" cmpd="sng">
-            <a:solidFill>
-              <a:schemeClr val="tx1">
-                <a:lumMod val="50000"/>
-                <a:lumOff val="50000"/>
-              </a:schemeClr>
-            </a:solidFill>
-            <a:prstDash val="solid"/>
-            <a:headEnd type="none"/>
-            <a:tailEnd type="none"/>
-          </a:ln>
-        </p:spPr>
-        <p:style>
-          <a:lnRef idx="2">
-            <a:schemeClr val="accent1"/>
-          </a:lnRef>
-          <a:fillRef idx="0">
-            <a:schemeClr val="accent1"/>
-          </a:fillRef>
-          <a:effectRef idx="1">
-            <a:schemeClr val="accent1"/>
-          </a:effectRef>
-          <a:fontRef idx="minor">
-            <a:schemeClr val="tx1"/>
-          </a:fontRef>
-        </p:style>
-      </p:cxnSp>
-      <p:sp>
-        <p:nvSpPr>
-          <p:cNvPr id="64" name="右中かっこ 63"/>
-          <p:cNvSpPr/>
-          <p:nvPr/>
-        </p:nvSpPr>
-        <p:spPr>
-          <a:xfrm>
-            <a:off x="7351555" y="-920809"/>
-            <a:ext cx="367100" cy="2016000"/>
-          </a:xfrm>
-          <a:prstGeom prst="rightBrace">
-            <a:avLst/>
-          </a:prstGeom>
-          <a:ln>
-            <a:solidFill>
-              <a:srgbClr val="7F7F7F"/>
-            </a:solidFill>
-          </a:ln>
-        </p:spPr>
-        <p:style>
-          <a:lnRef idx="2">
-            <a:schemeClr val="accent1"/>
-          </a:lnRef>
-          <a:fillRef idx="0">
-            <a:schemeClr val="accent1"/>
-          </a:fillRef>
-          <a:effectRef idx="1">
-            <a:schemeClr val="accent1"/>
-          </a:effectRef>
-          <a:fontRef idx="minor">
-            <a:schemeClr val="tx1"/>
-          </a:fontRef>
-        </p:style>
-        <p:txBody>
-          <a:bodyPr rtlCol="0" anchor="ctr"/>
-          <a:lstStyle/>
-          <a:p>
-            <a:pPr algn="ctr"/>
-            <a:endParaRPr kumimoji="1" lang="ja-JP" altLang="en-US"/>
-          </a:p>
-        </p:txBody>
-      </p:sp>
-      <p:sp>
-        <p:nvSpPr>
-          <p:cNvPr id="66" name="テキスト ボックス 65"/>
-          <p:cNvSpPr txBox="1"/>
-          <p:nvPr/>
-        </p:nvSpPr>
-        <p:spPr>
-          <a:xfrm>
-            <a:off x="7718655" y="-378608"/>
-            <a:ext cx="2152047" cy="923330"/>
-          </a:xfrm>
-          <a:prstGeom prst="rect">
-            <a:avLst/>
-          </a:prstGeom>
-          <a:noFill/>
-        </p:spPr>
-        <p:txBody>
-          <a:bodyPr wrap="square" rtlCol="0">
-            <a:spAutoFit/>
-          </a:bodyPr>
-          <a:lstStyle/>
-          <a:p>
-            <a:pPr algn="ctr"/>
-            <a:r>
-              <a:rPr lang="en-US" altLang="ja-JP" dirty="0" smtClean="0">
-                <a:solidFill>
-                  <a:schemeClr val="tx1">
-                    <a:lumMod val="65000"/>
-                    <a:lumOff val="35000"/>
-                  </a:schemeClr>
-                </a:solidFill>
-              </a:rPr>
-              <a:t>Provide</a:t>
-            </a:r>
-            <a:endParaRPr kumimoji="1" lang="en-US" altLang="ja-JP" dirty="0" smtClean="0">
-              <a:solidFill>
-                <a:schemeClr val="tx1">
-                  <a:lumMod val="65000"/>
-                  <a:lumOff val="35000"/>
-                </a:schemeClr>
-              </a:solidFill>
-            </a:endParaRPr>
-          </a:p>
-          <a:p>
-            <a:pPr algn="ctr"/>
-            <a:r>
-              <a:rPr lang="en-US" altLang="ja-JP" dirty="0" smtClean="0">
-                <a:solidFill>
-                  <a:schemeClr val="tx1">
-                    <a:lumMod val="65000"/>
-                    <a:lumOff val="35000"/>
-                  </a:schemeClr>
-                </a:solidFill>
-              </a:rPr>
-              <a:t>C</a:t>
-            </a:r>
-            <a:r>
-              <a:rPr kumimoji="1" lang="en-US" altLang="ja-JP" dirty="0" smtClean="0">
-                <a:solidFill>
-                  <a:schemeClr val="tx1">
-                    <a:lumMod val="65000"/>
-                    <a:lumOff val="35000"/>
-                  </a:schemeClr>
-                </a:solidFill>
-              </a:rPr>
-              <a:t>lasses</a:t>
-            </a:r>
-            <a:endParaRPr lang="en-US" altLang="ja-JP" dirty="0">
-              <a:solidFill>
-                <a:schemeClr val="tx1">
-                  <a:lumMod val="65000"/>
-                  <a:lumOff val="35000"/>
-                </a:schemeClr>
-              </a:solidFill>
-            </a:endParaRPr>
-          </a:p>
-          <a:p>
-            <a:pPr algn="ctr"/>
-            <a:r>
-              <a:rPr lang="en-US" altLang="ja-JP" dirty="0" smtClean="0">
-                <a:solidFill>
-                  <a:schemeClr val="tx1">
-                    <a:lumMod val="65000"/>
-                    <a:lumOff val="35000"/>
-                  </a:schemeClr>
-                </a:solidFill>
-              </a:rPr>
-              <a:t>(Standalone library)</a:t>
-            </a:r>
-            <a:endParaRPr kumimoji="1" lang="ja-JP" altLang="en-US" dirty="0">
-              <a:solidFill>
-                <a:schemeClr val="tx1">
-                  <a:lumMod val="65000"/>
-                  <a:lumOff val="35000"/>
-                </a:schemeClr>
-              </a:solidFill>
-            </a:endParaRPr>
-          </a:p>
-        </p:txBody>
-      </p:sp>
-      <p:sp>
-        <p:nvSpPr>
-          <p:cNvPr id="60" name="角丸四角形 59"/>
-          <p:cNvSpPr/>
-          <p:nvPr/>
-        </p:nvSpPr>
-        <p:spPr>
-          <a:xfrm>
-            <a:off x="3114778" y="3132060"/>
-            <a:ext cx="3377415" cy="368242"/>
-          </a:xfrm>
-          <a:prstGeom prst="roundRect">
-            <a:avLst/>
-          </a:prstGeom>
-          <a:gradFill>
-            <a:gsLst>
-              <a:gs pos="0">
-                <a:schemeClr val="bg1">
-                  <a:lumMod val="75000"/>
-                </a:schemeClr>
-              </a:gs>
-              <a:gs pos="100000">
-                <a:schemeClr val="bg1">
-                  <a:lumMod val="95000"/>
-                </a:schemeClr>
-              </a:gs>
-            </a:gsLst>
-          </a:gradFill>
-        </p:spPr>
-        <p:style>
-          <a:lnRef idx="1">
-            <a:schemeClr val="dk1"/>
-          </a:lnRef>
-          <a:fillRef idx="3">
-            <a:schemeClr val="dk1"/>
-          </a:fillRef>
-          <a:effectRef idx="2">
-            <a:schemeClr val="dk1"/>
-          </a:effectRef>
-          <a:fontRef idx="minor">
-            <a:schemeClr val="lt1"/>
-          </a:fontRef>
-        </p:style>
-        <p:txBody>
-          <a:bodyPr rtlCol="0" anchor="ctr"/>
-          <a:lstStyle/>
-          <a:p>
-            <a:pPr algn="ctr"/>
-            <a:r>
-              <a:rPr kumimoji="1" lang="en-US" altLang="ja-JP" sz="1600" dirty="0" smtClean="0">
-                <a:solidFill>
-                  <a:schemeClr val="tx1">
-                    <a:lumMod val="75000"/>
-                    <a:lumOff val="25000"/>
-                  </a:schemeClr>
-                </a:solidFill>
-              </a:rPr>
-              <a:t>web</a:t>
-            </a:r>
-            <a:r>
-              <a:rPr lang="en-US" altLang="ja-JP" sz="1600" dirty="0" smtClean="0">
-                <a:solidFill>
-                  <a:schemeClr val="tx1">
-                    <a:lumMod val="75000"/>
-                    <a:lumOff val="25000"/>
-                  </a:schemeClr>
-                </a:solidFill>
-              </a:rPr>
-              <a:t>-</a:t>
-            </a:r>
-            <a:r>
-              <a:rPr lang="en-US" altLang="ja-JP" sz="1600" dirty="0" err="1" smtClean="0">
-                <a:solidFill>
-                  <a:schemeClr val="tx1">
-                    <a:lumMod val="75000"/>
-                    <a:lumOff val="25000"/>
-                  </a:schemeClr>
-                </a:solidFill>
-              </a:rPr>
-              <a:t>jsp</a:t>
-            </a:r>
-            <a:endParaRPr kumimoji="1" lang="en-US" altLang="ja-JP" sz="1600" dirty="0" smtClean="0">
-              <a:solidFill>
-                <a:schemeClr val="tx1">
-                  <a:lumMod val="75000"/>
-                  <a:lumOff val="25000"/>
-                </a:schemeClr>
-              </a:solidFill>
-            </a:endParaRPr>
-          </a:p>
-        </p:txBody>
-      </p:sp>
-      <p:sp>
-        <p:nvSpPr>
-          <p:cNvPr id="69" name="テキスト ボックス 68"/>
-          <p:cNvSpPr txBox="1"/>
-          <p:nvPr/>
-        </p:nvSpPr>
-        <p:spPr>
-          <a:xfrm>
-            <a:off x="4906044" y="4130687"/>
+            <a:off x="8162655" y="2838483"/>
             <a:ext cx="810851" cy="307777"/>
           </a:xfrm>
           <a:prstGeom prst="rect">
@@ -9148,100 +9815,10 @@
           </a:p>
         </p:txBody>
       </p:sp>
-      <p:cxnSp>
-        <p:nvCxnSpPr>
-          <p:cNvPr id="21" name="カギ線コネクタ 20"/>
-          <p:cNvCxnSpPr>
-            <a:stCxn id="47" idx="3"/>
-            <a:endCxn id="53" idx="3"/>
-          </p:cNvCxnSpPr>
-          <p:nvPr/>
-        </p:nvCxnSpPr>
-        <p:spPr>
-          <a:xfrm flipV="1">
-            <a:off x="6482271" y="2669696"/>
-            <a:ext cx="9922" cy="1292970"/>
-          </a:xfrm>
-          <a:prstGeom prst="bentConnector3">
-            <a:avLst>
-              <a:gd name="adj1" fmla="val 2403971"/>
-            </a:avLst>
-          </a:prstGeom>
-          <a:ln w="12700" cmpd="sng">
-            <a:solidFill>
-              <a:schemeClr val="tx1">
-                <a:lumMod val="50000"/>
-                <a:lumOff val="50000"/>
-              </a:schemeClr>
-            </a:solidFill>
-            <a:prstDash val="sysDash"/>
-            <a:headEnd type="none"/>
-            <a:tailEnd type="triangle"/>
-          </a:ln>
-        </p:spPr>
-        <p:style>
-          <a:lnRef idx="2">
-            <a:schemeClr val="accent1"/>
-          </a:lnRef>
-          <a:fillRef idx="0">
-            <a:schemeClr val="accent1"/>
-          </a:fillRef>
-          <a:effectRef idx="1">
-            <a:schemeClr val="accent1"/>
-          </a:effectRef>
-          <a:fontRef idx="minor">
-            <a:schemeClr val="tx1"/>
-          </a:fontRef>
-        </p:style>
-      </p:cxnSp>
-      <p:cxnSp>
-        <p:nvCxnSpPr>
-          <p:cNvPr id="45" name="直線コネクタ 2"/>
-          <p:cNvCxnSpPr>
-            <a:stCxn id="60" idx="1"/>
-            <a:endCxn id="56" idx="3"/>
-          </p:cNvCxnSpPr>
-          <p:nvPr/>
-        </p:nvCxnSpPr>
-        <p:spPr>
-          <a:xfrm flipH="1" flipV="1">
-            <a:off x="1574558" y="2723421"/>
-            <a:ext cx="1540220" cy="592760"/>
-          </a:xfrm>
-          <a:prstGeom prst="straightConnector1">
-            <a:avLst/>
-          </a:prstGeom>
-          <a:ln w="12700" cmpd="sng">
-            <a:solidFill>
-              <a:schemeClr val="tx1">
-                <a:lumMod val="50000"/>
-                <a:lumOff val="50000"/>
-              </a:schemeClr>
-            </a:solidFill>
-            <a:prstDash val="solid"/>
-            <a:headEnd type="none"/>
-            <a:tailEnd type="none"/>
-          </a:ln>
-        </p:spPr>
-        <p:style>
-          <a:lnRef idx="2">
-            <a:schemeClr val="accent1"/>
-          </a:lnRef>
-          <a:fillRef idx="0">
-            <a:schemeClr val="accent1"/>
-          </a:fillRef>
-          <a:effectRef idx="1">
-            <a:schemeClr val="accent1"/>
-          </a:effectRef>
-          <a:fontRef idx="minor">
-            <a:schemeClr val="tx1"/>
-          </a:fontRef>
-        </p:style>
-      </p:cxnSp>
     </p:spTree>
     <p:extLst>
       <p:ext uri="{BB962C8B-B14F-4D97-AF65-F5344CB8AC3E}">
-        <p14:creationId xmlns:p14="http://schemas.microsoft.com/office/powerpoint/2010/main" val="399619677"/>
+        <p14:creationId xmlns:p14="http://schemas.microsoft.com/office/powerpoint/2010/main" val="3064334524"/>
       </p:ext>
     </p:extLst>
   </p:cSld>

</xml_diff>

<commit_message>
rearrange the order of artifacts #1982
</commit_message>
<xml_diff>
--- a/source/Overview/images_FrameworkStack/materialFrameworkStack.pptx
+++ b/source/Overview/images_FrameworkStack/materialFrameworkStack.pptx
@@ -122,7 +122,7 @@
       </p14:sectionLst>
     </p:ext>
     <p:ext uri="{EFAFB233-063F-42B5-8137-9DF3F51BA10A}">
-      <p15:sldGuideLst xmlns="" xmlns:p15="http://schemas.microsoft.com/office/powerpoint/2012/main">
+      <p15:sldGuideLst xmlns:p15="http://schemas.microsoft.com/office/powerpoint/2012/main" xmlns="">
         <p15:guide id="1" orient="horz" pos="2160">
           <p15:clr>
             <a:srgbClr val="A4A3A4"/>
@@ -221,7 +221,7 @@
           <a:p>
             <a:fld id="{3BB47352-BF5A-4CD2-B029-996118CD8E01}" type="datetimeFigureOut">
               <a:rPr kumimoji="1" lang="ja-JP" altLang="en-US" smtClean="0"/>
-              <a:t>2016/8/1</a:t>
+              <a:t>2016/8/9</a:t>
             </a:fld>
             <a:endParaRPr kumimoji="1" lang="ja-JP" altLang="en-US"/>
           </a:p>
@@ -954,7 +954,7 @@
           <a:p>
             <a:fld id="{7B9B12EC-6AA0-374B-A2D3-850081A07A26}" type="datetimeFigureOut">
               <a:rPr kumimoji="1" lang="ja-JP" altLang="en-US" smtClean="0"/>
-              <a:t>2016/8/1</a:t>
+              <a:t>2016/8/9</a:t>
             </a:fld>
             <a:endParaRPr kumimoji="1" lang="ja-JP" altLang="en-US"/>
           </a:p>
@@ -1156,7 +1156,7 @@
           <a:p>
             <a:fld id="{7B9B12EC-6AA0-374B-A2D3-850081A07A26}" type="datetimeFigureOut">
               <a:rPr kumimoji="1" lang="ja-JP" altLang="en-US" smtClean="0"/>
-              <a:t>2016/8/1</a:t>
+              <a:t>2016/8/9</a:t>
             </a:fld>
             <a:endParaRPr kumimoji="1" lang="ja-JP" altLang="en-US"/>
           </a:p>
@@ -1368,7 +1368,7 @@
           <a:p>
             <a:fld id="{7B9B12EC-6AA0-374B-A2D3-850081A07A26}" type="datetimeFigureOut">
               <a:rPr kumimoji="1" lang="ja-JP" altLang="en-US" smtClean="0"/>
-              <a:t>2016/8/1</a:t>
+              <a:t>2016/8/9</a:t>
             </a:fld>
             <a:endParaRPr kumimoji="1" lang="ja-JP" altLang="en-US"/>
           </a:p>
@@ -1570,7 +1570,7 @@
           <a:p>
             <a:fld id="{7B9B12EC-6AA0-374B-A2D3-850081A07A26}" type="datetimeFigureOut">
               <a:rPr kumimoji="1" lang="ja-JP" altLang="en-US" smtClean="0"/>
-              <a:t>2016/8/1</a:t>
+              <a:t>2016/8/9</a:t>
             </a:fld>
             <a:endParaRPr kumimoji="1" lang="ja-JP" altLang="en-US"/>
           </a:p>
@@ -1816,7 +1816,7 @@
           <a:p>
             <a:fld id="{7B9B12EC-6AA0-374B-A2D3-850081A07A26}" type="datetimeFigureOut">
               <a:rPr kumimoji="1" lang="ja-JP" altLang="en-US" smtClean="0"/>
-              <a:t>2016/8/1</a:t>
+              <a:t>2016/8/9</a:t>
             </a:fld>
             <a:endParaRPr kumimoji="1" lang="ja-JP" altLang="en-US"/>
           </a:p>
@@ -2168,7 +2168,7 @@
           <a:p>
             <a:fld id="{7B9B12EC-6AA0-374B-A2D3-850081A07A26}" type="datetimeFigureOut">
               <a:rPr kumimoji="1" lang="ja-JP" altLang="en-US" smtClean="0"/>
-              <a:t>2016/8/1</a:t>
+              <a:t>2016/8/9</a:t>
             </a:fld>
             <a:endParaRPr kumimoji="1" lang="ja-JP" altLang="en-US"/>
           </a:p>
@@ -2654,7 +2654,7 @@
           <a:p>
             <a:fld id="{7B9B12EC-6AA0-374B-A2D3-850081A07A26}" type="datetimeFigureOut">
               <a:rPr kumimoji="1" lang="ja-JP" altLang="en-US" smtClean="0"/>
-              <a:t>2016/8/1</a:t>
+              <a:t>2016/8/9</a:t>
             </a:fld>
             <a:endParaRPr kumimoji="1" lang="ja-JP" altLang="en-US"/>
           </a:p>
@@ -2772,7 +2772,7 @@
           <a:p>
             <a:fld id="{7B9B12EC-6AA0-374B-A2D3-850081A07A26}" type="datetimeFigureOut">
               <a:rPr kumimoji="1" lang="ja-JP" altLang="en-US" smtClean="0"/>
-              <a:t>2016/8/1</a:t>
+              <a:t>2016/8/9</a:t>
             </a:fld>
             <a:endParaRPr kumimoji="1" lang="ja-JP" altLang="en-US"/>
           </a:p>
@@ -2867,7 +2867,7 @@
           <a:p>
             <a:fld id="{7B9B12EC-6AA0-374B-A2D3-850081A07A26}" type="datetimeFigureOut">
               <a:rPr kumimoji="1" lang="ja-JP" altLang="en-US" smtClean="0"/>
-              <a:t>2016/8/1</a:t>
+              <a:t>2016/8/9</a:t>
             </a:fld>
             <a:endParaRPr kumimoji="1" lang="ja-JP" altLang="en-US"/>
           </a:p>
@@ -3176,7 +3176,7 @@
           <a:p>
             <a:fld id="{7B9B12EC-6AA0-374B-A2D3-850081A07A26}" type="datetimeFigureOut">
               <a:rPr kumimoji="1" lang="ja-JP" altLang="en-US" smtClean="0"/>
-              <a:t>2016/8/1</a:t>
+              <a:t>2016/8/9</a:t>
             </a:fld>
             <a:endParaRPr kumimoji="1" lang="ja-JP" altLang="en-US"/>
           </a:p>
@@ -3429,7 +3429,7 @@
           <a:p>
             <a:fld id="{7B9B12EC-6AA0-374B-A2D3-850081A07A26}" type="datetimeFigureOut">
               <a:rPr kumimoji="1" lang="ja-JP" altLang="en-US" smtClean="0"/>
-              <a:t>2016/8/1</a:t>
+              <a:t>2016/8/9</a:t>
             </a:fld>
             <a:endParaRPr kumimoji="1" lang="ja-JP" altLang="en-US"/>
           </a:p>
@@ -3674,7 +3674,7 @@
           <a:p>
             <a:fld id="{7B9B12EC-6AA0-374B-A2D3-850081A07A26}" type="datetimeFigureOut">
               <a:rPr kumimoji="1" lang="ja-JP" altLang="en-US" smtClean="0"/>
-              <a:t>2016/8/1</a:t>
+              <a:t>2016/8/9</a:t>
             </a:fld>
             <a:endParaRPr kumimoji="1" lang="ja-JP" altLang="en-US"/>
           </a:p>
@@ -7214,7 +7214,7 @@
         </p:nvSpPr>
         <p:spPr>
           <a:xfrm>
-            <a:off x="378016" y="1801800"/>
+            <a:off x="378016" y="1155256"/>
             <a:ext cx="3387338" cy="368242"/>
           </a:xfrm>
           <a:prstGeom prst="roundRect">
@@ -7346,7 +7346,7 @@
         </p:nvSpPr>
         <p:spPr>
           <a:xfrm>
-            <a:off x="378017" y="1155315"/>
+            <a:off x="378017" y="1802799"/>
             <a:ext cx="3387338" cy="368242"/>
           </a:xfrm>
           <a:prstGeom prst="roundRect">
@@ -7456,15 +7456,15 @@
         <p:nvCxnSpPr>
           <p:cNvPr id="65" name="直線コネクタ 2"/>
           <p:cNvCxnSpPr>
-            <a:stCxn id="55" idx="2"/>
-            <a:endCxn id="52" idx="0"/>
+            <a:stCxn id="55" idx="0"/>
+            <a:endCxn id="52" idx="2"/>
           </p:cNvCxnSpPr>
           <p:nvPr/>
         </p:nvCxnSpPr>
         <p:spPr>
-          <a:xfrm flipH="1">
-            <a:off x="2071685" y="1523557"/>
-            <a:ext cx="1" cy="278243"/>
+          <a:xfrm flipH="1" flipV="1">
+            <a:off x="2071685" y="1523498"/>
+            <a:ext cx="1" cy="279301"/>
           </a:xfrm>
           <a:prstGeom prst="straightConnector1">
             <a:avLst/>
@@ -7496,22 +7496,494 @@
           </a:fontRef>
         </p:style>
       </p:cxnSp>
+      <p:sp>
+        <p:nvSpPr>
+          <p:cNvPr id="88" name="テキスト ボックス 87"/>
+          <p:cNvSpPr txBox="1"/>
+          <p:nvPr/>
+        </p:nvSpPr>
+        <p:spPr>
+          <a:xfrm>
+            <a:off x="2170906" y="1505662"/>
+            <a:ext cx="810851" cy="307777"/>
+          </a:xfrm>
+          <a:prstGeom prst="rect">
+            <a:avLst/>
+          </a:prstGeom>
+          <a:noFill/>
+        </p:spPr>
+        <p:txBody>
+          <a:bodyPr wrap="none" rtlCol="0">
+            <a:spAutoFit/>
+          </a:bodyPr>
+          <a:lstStyle/>
+          <a:p>
+            <a:r>
+              <a:rPr kumimoji="1" lang="en-US" altLang="ja-JP" sz="1400" dirty="0" smtClean="0">
+                <a:solidFill>
+                  <a:schemeClr val="tx1">
+                    <a:lumMod val="50000"/>
+                    <a:lumOff val="50000"/>
+                  </a:schemeClr>
+                </a:solidFill>
+              </a:rPr>
+              <a:t>depends</a:t>
+            </a:r>
+            <a:endParaRPr kumimoji="1" lang="ja-JP" altLang="en-US" sz="1400" dirty="0">
+              <a:solidFill>
+                <a:schemeClr val="tx1">
+                  <a:lumMod val="50000"/>
+                  <a:lumOff val="50000"/>
+                </a:schemeClr>
+              </a:solidFill>
+            </a:endParaRPr>
+          </a:p>
+        </p:txBody>
+      </p:sp>
+      <p:sp>
+        <p:nvSpPr>
+          <p:cNvPr id="92" name="テキスト ボックス 91"/>
+          <p:cNvSpPr txBox="1"/>
+          <p:nvPr/>
+        </p:nvSpPr>
+        <p:spPr>
+          <a:xfrm>
+            <a:off x="2170906" y="2799108"/>
+            <a:ext cx="810851" cy="307777"/>
+          </a:xfrm>
+          <a:prstGeom prst="rect">
+            <a:avLst/>
+          </a:prstGeom>
+          <a:noFill/>
+        </p:spPr>
+        <p:txBody>
+          <a:bodyPr wrap="none" rtlCol="0">
+            <a:spAutoFit/>
+          </a:bodyPr>
+          <a:lstStyle/>
+          <a:p>
+            <a:r>
+              <a:rPr kumimoji="1" lang="en-US" altLang="ja-JP" sz="1400" dirty="0" smtClean="0">
+                <a:solidFill>
+                  <a:schemeClr val="tx1">
+                    <a:lumMod val="50000"/>
+                    <a:lumOff val="50000"/>
+                  </a:schemeClr>
+                </a:solidFill>
+              </a:rPr>
+              <a:t>depends</a:t>
+            </a:r>
+            <a:endParaRPr kumimoji="1" lang="ja-JP" altLang="en-US" sz="1400" dirty="0">
+              <a:solidFill>
+                <a:schemeClr val="tx1">
+                  <a:lumMod val="50000"/>
+                  <a:lumOff val="50000"/>
+                </a:schemeClr>
+              </a:solidFill>
+            </a:endParaRPr>
+          </a:p>
+        </p:txBody>
+      </p:sp>
+      <p:sp>
+        <p:nvSpPr>
+          <p:cNvPr id="93" name="テキスト ボックス 92"/>
+          <p:cNvSpPr txBox="1"/>
+          <p:nvPr/>
+        </p:nvSpPr>
+        <p:spPr>
+          <a:xfrm>
+            <a:off x="99969" y="3449965"/>
+            <a:ext cx="810851" cy="307777"/>
+          </a:xfrm>
+          <a:prstGeom prst="rect">
+            <a:avLst/>
+          </a:prstGeom>
+          <a:noFill/>
+        </p:spPr>
+        <p:txBody>
+          <a:bodyPr wrap="none" rtlCol="0">
+            <a:spAutoFit/>
+          </a:bodyPr>
+          <a:lstStyle/>
+          <a:p>
+            <a:r>
+              <a:rPr kumimoji="1" lang="en-US" altLang="ja-JP" sz="1400" dirty="0" smtClean="0">
+                <a:solidFill>
+                  <a:schemeClr val="tx1">
+                    <a:lumMod val="50000"/>
+                    <a:lumOff val="50000"/>
+                  </a:schemeClr>
+                </a:solidFill>
+              </a:rPr>
+              <a:t>depends</a:t>
+            </a:r>
+            <a:endParaRPr kumimoji="1" lang="ja-JP" altLang="en-US" sz="1400" dirty="0">
+              <a:solidFill>
+                <a:schemeClr val="tx1">
+                  <a:lumMod val="50000"/>
+                  <a:lumOff val="50000"/>
+                </a:schemeClr>
+              </a:solidFill>
+            </a:endParaRPr>
+          </a:p>
+        </p:txBody>
+      </p:sp>
+      <p:sp>
+        <p:nvSpPr>
+          <p:cNvPr id="34" name="角丸四角形 33"/>
+          <p:cNvSpPr/>
+          <p:nvPr/>
+        </p:nvSpPr>
+        <p:spPr>
+          <a:xfrm>
+            <a:off x="368094" y="5080969"/>
+            <a:ext cx="3387338" cy="368242"/>
+          </a:xfrm>
+          <a:prstGeom prst="roundRect">
+            <a:avLst/>
+          </a:prstGeom>
+          <a:gradFill>
+            <a:gsLst>
+              <a:gs pos="0">
+                <a:schemeClr val="bg1">
+                  <a:lumMod val="75000"/>
+                </a:schemeClr>
+              </a:gs>
+              <a:gs pos="100000">
+                <a:schemeClr val="bg1">
+                  <a:lumMod val="95000"/>
+                </a:schemeClr>
+              </a:gs>
+            </a:gsLst>
+          </a:gradFill>
+        </p:spPr>
+        <p:style>
+          <a:lnRef idx="1">
+            <a:schemeClr val="dk1"/>
+          </a:lnRef>
+          <a:fillRef idx="3">
+            <a:schemeClr val="dk1"/>
+          </a:fillRef>
+          <a:effectRef idx="2">
+            <a:schemeClr val="dk1"/>
+          </a:effectRef>
+          <a:fontRef idx="minor">
+            <a:schemeClr val="lt1"/>
+          </a:fontRef>
+        </p:style>
+        <p:txBody>
+          <a:bodyPr rtlCol="0" anchor="ctr"/>
+          <a:lstStyle/>
+          <a:p>
+            <a:pPr algn="ctr"/>
+            <a:r>
+              <a:rPr lang="en-US" altLang="ja-JP" sz="1600" dirty="0" err="1" smtClean="0">
+                <a:solidFill>
+                  <a:schemeClr val="tx1">
+                    <a:lumMod val="75000"/>
+                    <a:lumOff val="25000"/>
+                  </a:schemeClr>
+                </a:solidFill>
+              </a:rPr>
+              <a:t>codepoints</a:t>
+            </a:r>
+            <a:endParaRPr kumimoji="1" lang="en-US" altLang="ja-JP" sz="1600" dirty="0" smtClean="0">
+              <a:solidFill>
+                <a:schemeClr val="tx1">
+                  <a:lumMod val="75000"/>
+                  <a:lumOff val="25000"/>
+                </a:schemeClr>
+              </a:solidFill>
+            </a:endParaRPr>
+          </a:p>
+        </p:txBody>
+      </p:sp>
+      <p:sp>
+        <p:nvSpPr>
+          <p:cNvPr id="35" name="角丸四角形 34"/>
+          <p:cNvSpPr/>
+          <p:nvPr/>
+        </p:nvSpPr>
+        <p:spPr>
+          <a:xfrm>
+            <a:off x="368094" y="4434484"/>
+            <a:ext cx="3387338" cy="368242"/>
+          </a:xfrm>
+          <a:prstGeom prst="roundRect">
+            <a:avLst/>
+          </a:prstGeom>
+          <a:gradFill>
+            <a:gsLst>
+              <a:gs pos="0">
+                <a:schemeClr val="bg1">
+                  <a:lumMod val="75000"/>
+                </a:schemeClr>
+              </a:gs>
+              <a:gs pos="100000">
+                <a:schemeClr val="bg1">
+                  <a:lumMod val="95000"/>
+                </a:schemeClr>
+              </a:gs>
+            </a:gsLst>
+          </a:gradFill>
+        </p:spPr>
+        <p:style>
+          <a:lnRef idx="1">
+            <a:schemeClr val="dk1"/>
+          </a:lnRef>
+          <a:fillRef idx="3">
+            <a:schemeClr val="dk1"/>
+          </a:fillRef>
+          <a:effectRef idx="2">
+            <a:schemeClr val="dk1"/>
+          </a:effectRef>
+          <a:fontRef idx="minor">
+            <a:schemeClr val="lt1"/>
+          </a:fontRef>
+        </p:style>
+        <p:txBody>
+          <a:bodyPr rtlCol="0" anchor="ctr"/>
+          <a:lstStyle/>
+          <a:p>
+            <a:pPr algn="ctr"/>
+            <a:r>
+              <a:rPr kumimoji="1" lang="en-US" altLang="ja-JP" sz="1600" dirty="0" smtClean="0">
+                <a:solidFill>
+                  <a:schemeClr val="tx1">
+                    <a:lumMod val="75000"/>
+                    <a:lumOff val="25000"/>
+                  </a:schemeClr>
+                </a:solidFill>
+              </a:rPr>
+              <a:t>string</a:t>
+            </a:r>
+          </a:p>
+        </p:txBody>
+      </p:sp>
+      <p:sp>
+        <p:nvSpPr>
+          <p:cNvPr id="36" name="角丸四角形 35"/>
+          <p:cNvSpPr/>
+          <p:nvPr/>
+        </p:nvSpPr>
+        <p:spPr>
+          <a:xfrm>
+            <a:off x="368094" y="5727454"/>
+            <a:ext cx="3387338" cy="368242"/>
+          </a:xfrm>
+          <a:prstGeom prst="roundRect">
+            <a:avLst/>
+          </a:prstGeom>
+          <a:gradFill>
+            <a:gsLst>
+              <a:gs pos="0">
+                <a:schemeClr val="bg1">
+                  <a:lumMod val="75000"/>
+                </a:schemeClr>
+              </a:gs>
+              <a:gs pos="100000">
+                <a:schemeClr val="bg1">
+                  <a:lumMod val="95000"/>
+                </a:schemeClr>
+              </a:gs>
+            </a:gsLst>
+          </a:gradFill>
+        </p:spPr>
+        <p:style>
+          <a:lnRef idx="1">
+            <a:schemeClr val="dk1"/>
+          </a:lnRef>
+          <a:fillRef idx="3">
+            <a:schemeClr val="dk1"/>
+          </a:fillRef>
+          <a:effectRef idx="2">
+            <a:schemeClr val="dk1"/>
+          </a:effectRef>
+          <a:fontRef idx="minor">
+            <a:schemeClr val="lt1"/>
+          </a:fontRef>
+        </p:style>
+        <p:txBody>
+          <a:bodyPr rtlCol="0" anchor="ctr"/>
+          <a:lstStyle/>
+          <a:p>
+            <a:pPr algn="ctr"/>
+            <a:r>
+              <a:rPr lang="en-US" altLang="ja-JP" sz="1600" dirty="0" smtClean="0">
+                <a:solidFill>
+                  <a:schemeClr val="tx1">
+                    <a:lumMod val="75000"/>
+                    <a:lumOff val="25000"/>
+                  </a:schemeClr>
+                </a:solidFill>
+              </a:rPr>
+              <a:t>validator</a:t>
+            </a:r>
+            <a:endParaRPr kumimoji="1" lang="en-US" altLang="ja-JP" sz="1600" dirty="0" smtClean="0">
+              <a:solidFill>
+                <a:schemeClr val="tx1">
+                  <a:lumMod val="75000"/>
+                  <a:lumOff val="25000"/>
+                </a:schemeClr>
+              </a:solidFill>
+            </a:endParaRPr>
+          </a:p>
+        </p:txBody>
+      </p:sp>
+      <p:sp>
+        <p:nvSpPr>
+          <p:cNvPr id="60" name="角丸四角形 59"/>
+          <p:cNvSpPr/>
+          <p:nvPr/>
+        </p:nvSpPr>
+        <p:spPr>
+          <a:xfrm>
+            <a:off x="387939" y="3094770"/>
+            <a:ext cx="3377415" cy="368242"/>
+          </a:xfrm>
+          <a:prstGeom prst="roundRect">
+            <a:avLst/>
+          </a:prstGeom>
+          <a:gradFill>
+            <a:gsLst>
+              <a:gs pos="0">
+                <a:schemeClr val="bg1">
+                  <a:lumMod val="75000"/>
+                </a:schemeClr>
+              </a:gs>
+              <a:gs pos="100000">
+                <a:schemeClr val="bg1">
+                  <a:lumMod val="95000"/>
+                </a:schemeClr>
+              </a:gs>
+            </a:gsLst>
+          </a:gradFill>
+        </p:spPr>
+        <p:style>
+          <a:lnRef idx="1">
+            <a:schemeClr val="dk1"/>
+          </a:lnRef>
+          <a:fillRef idx="3">
+            <a:schemeClr val="dk1"/>
+          </a:fillRef>
+          <a:effectRef idx="2">
+            <a:schemeClr val="dk1"/>
+          </a:effectRef>
+          <a:fontRef idx="minor">
+            <a:schemeClr val="lt1"/>
+          </a:fontRef>
+        </p:style>
+        <p:txBody>
+          <a:bodyPr rtlCol="0" anchor="ctr"/>
+          <a:lstStyle/>
+          <a:p>
+            <a:pPr algn="ctr"/>
+            <a:r>
+              <a:rPr kumimoji="1" lang="en-US" altLang="ja-JP" sz="1600" dirty="0" smtClean="0">
+                <a:solidFill>
+                  <a:schemeClr val="tx1">
+                    <a:lumMod val="75000"/>
+                    <a:lumOff val="25000"/>
+                  </a:schemeClr>
+                </a:solidFill>
+              </a:rPr>
+              <a:t>web</a:t>
+            </a:r>
+            <a:r>
+              <a:rPr lang="en-US" altLang="ja-JP" sz="1600" dirty="0" smtClean="0">
+                <a:solidFill>
+                  <a:schemeClr val="tx1">
+                    <a:lumMod val="75000"/>
+                    <a:lumOff val="25000"/>
+                  </a:schemeClr>
+                </a:solidFill>
+              </a:rPr>
+              <a:t>-</a:t>
+            </a:r>
+            <a:r>
+              <a:rPr lang="en-US" altLang="ja-JP" sz="1600" dirty="0" err="1" smtClean="0">
+                <a:solidFill>
+                  <a:schemeClr val="tx1">
+                    <a:lumMod val="75000"/>
+                    <a:lumOff val="25000"/>
+                  </a:schemeClr>
+                </a:solidFill>
+              </a:rPr>
+              <a:t>jsp</a:t>
+            </a:r>
+            <a:endParaRPr kumimoji="1" lang="en-US" altLang="ja-JP" sz="1600" dirty="0" smtClean="0">
+              <a:solidFill>
+                <a:schemeClr val="tx1">
+                  <a:lumMod val="75000"/>
+                  <a:lumOff val="25000"/>
+                </a:schemeClr>
+              </a:solidFill>
+            </a:endParaRPr>
+          </a:p>
+        </p:txBody>
+      </p:sp>
+      <p:sp>
+        <p:nvSpPr>
+          <p:cNvPr id="69" name="テキスト ボックス 68"/>
+          <p:cNvSpPr txBox="1"/>
+          <p:nvPr/>
+        </p:nvSpPr>
+        <p:spPr>
+          <a:xfrm>
+            <a:off x="7158523" y="1145849"/>
+            <a:ext cx="810851" cy="307777"/>
+          </a:xfrm>
+          <a:prstGeom prst="rect">
+            <a:avLst/>
+          </a:prstGeom>
+          <a:noFill/>
+        </p:spPr>
+        <p:txBody>
+          <a:bodyPr wrap="none" rtlCol="0">
+            <a:spAutoFit/>
+          </a:bodyPr>
+          <a:lstStyle/>
+          <a:p>
+            <a:r>
+              <a:rPr kumimoji="1" lang="en-US" altLang="ja-JP" sz="1400" dirty="0" smtClean="0">
+                <a:solidFill>
+                  <a:schemeClr val="tx1">
+                    <a:lumMod val="50000"/>
+                    <a:lumOff val="50000"/>
+                  </a:schemeClr>
+                </a:solidFill>
+              </a:rPr>
+              <a:t>depends</a:t>
+            </a:r>
+            <a:endParaRPr kumimoji="1" lang="ja-JP" altLang="en-US" sz="1400" dirty="0">
+              <a:solidFill>
+                <a:schemeClr val="tx1">
+                  <a:lumMod val="50000"/>
+                  <a:lumOff val="50000"/>
+                </a:schemeClr>
+              </a:solidFill>
+            </a:endParaRPr>
+          </a:p>
+        </p:txBody>
+      </p:sp>
       <p:cxnSp>
         <p:nvCxnSpPr>
-          <p:cNvPr id="85" name="直線コネクタ 2"/>
+          <p:cNvPr id="21" name="カギ線コネクタ 20"/>
           <p:cNvCxnSpPr>
-            <a:stCxn id="53" idx="0"/>
-            <a:endCxn id="52" idx="2"/>
+            <a:stCxn id="47" idx="1"/>
+            <a:endCxn id="53" idx="1"/>
           </p:cNvCxnSpPr>
           <p:nvPr/>
         </p:nvCxnSpPr>
         <p:spPr>
-          <a:xfrm flipH="1" flipV="1">
-            <a:off x="2071685" y="2170042"/>
-            <a:ext cx="4962" cy="278243"/>
-          </a:xfrm>
-          <a:prstGeom prst="straightConnector1">
-            <a:avLst/>
+          <a:xfrm rot="10800000">
+            <a:off x="387940" y="2632406"/>
+            <a:ext cx="3569" cy="1292970"/>
+          </a:xfrm>
+          <a:prstGeom prst="bentConnector3">
+            <a:avLst>
+              <a:gd name="adj1" fmla="val 6505156"/>
+            </a:avLst>
           </a:prstGeom>
           <a:ln w="12700" cmpd="sng">
             <a:solidFill>
@@ -7522,7 +7994,7 @@
             </a:solidFill>
             <a:prstDash val="sysDash"/>
             <a:headEnd type="none"/>
-            <a:tailEnd type="arrow"/>
+            <a:tailEnd type="triangle"/>
           </a:ln>
         </p:spPr>
         <p:style>
@@ -7542,566 +8014,6 @@
       </p:cxnSp>
       <p:sp>
         <p:nvSpPr>
-          <p:cNvPr id="88" name="テキスト ボックス 87"/>
-          <p:cNvSpPr txBox="1"/>
-          <p:nvPr/>
-        </p:nvSpPr>
-        <p:spPr>
-          <a:xfrm>
-            <a:off x="2170906" y="1505662"/>
-            <a:ext cx="810851" cy="307777"/>
-          </a:xfrm>
-          <a:prstGeom prst="rect">
-            <a:avLst/>
-          </a:prstGeom>
-          <a:noFill/>
-        </p:spPr>
-        <p:txBody>
-          <a:bodyPr wrap="none" rtlCol="0">
-            <a:spAutoFit/>
-          </a:bodyPr>
-          <a:lstStyle/>
-          <a:p>
-            <a:r>
-              <a:rPr kumimoji="1" lang="en-US" altLang="ja-JP" sz="1400" dirty="0" smtClean="0">
-                <a:solidFill>
-                  <a:schemeClr val="tx1">
-                    <a:lumMod val="50000"/>
-                    <a:lumOff val="50000"/>
-                  </a:schemeClr>
-                </a:solidFill>
-              </a:rPr>
-              <a:t>depends</a:t>
-            </a:r>
-            <a:endParaRPr kumimoji="1" lang="ja-JP" altLang="en-US" sz="1400" dirty="0">
-              <a:solidFill>
-                <a:schemeClr val="tx1">
-                  <a:lumMod val="50000"/>
-                  <a:lumOff val="50000"/>
-                </a:schemeClr>
-              </a:solidFill>
-            </a:endParaRPr>
-          </a:p>
-        </p:txBody>
-      </p:sp>
-      <p:sp>
-        <p:nvSpPr>
-          <p:cNvPr id="91" name="テキスト ボックス 90"/>
-          <p:cNvSpPr txBox="1"/>
-          <p:nvPr/>
-        </p:nvSpPr>
-        <p:spPr>
-          <a:xfrm>
-            <a:off x="2171114" y="2151984"/>
-            <a:ext cx="810851" cy="307777"/>
-          </a:xfrm>
-          <a:prstGeom prst="rect">
-            <a:avLst/>
-          </a:prstGeom>
-          <a:noFill/>
-        </p:spPr>
-        <p:txBody>
-          <a:bodyPr wrap="none" rtlCol="0">
-            <a:spAutoFit/>
-          </a:bodyPr>
-          <a:lstStyle/>
-          <a:p>
-            <a:r>
-              <a:rPr kumimoji="1" lang="en-US" altLang="ja-JP" sz="1400" dirty="0" smtClean="0">
-                <a:solidFill>
-                  <a:schemeClr val="tx1">
-                    <a:lumMod val="50000"/>
-                    <a:lumOff val="50000"/>
-                  </a:schemeClr>
-                </a:solidFill>
-              </a:rPr>
-              <a:t>depends</a:t>
-            </a:r>
-            <a:endParaRPr kumimoji="1" lang="ja-JP" altLang="en-US" sz="1400" dirty="0">
-              <a:solidFill>
-                <a:schemeClr val="tx1">
-                  <a:lumMod val="50000"/>
-                  <a:lumOff val="50000"/>
-                </a:schemeClr>
-              </a:solidFill>
-            </a:endParaRPr>
-          </a:p>
-        </p:txBody>
-      </p:sp>
-      <p:sp>
-        <p:nvSpPr>
-          <p:cNvPr id="92" name="テキスト ボックス 91"/>
-          <p:cNvSpPr txBox="1"/>
-          <p:nvPr/>
-        </p:nvSpPr>
-        <p:spPr>
-          <a:xfrm>
-            <a:off x="2170906" y="2799108"/>
-            <a:ext cx="810851" cy="307777"/>
-          </a:xfrm>
-          <a:prstGeom prst="rect">
-            <a:avLst/>
-          </a:prstGeom>
-          <a:noFill/>
-        </p:spPr>
-        <p:txBody>
-          <a:bodyPr wrap="none" rtlCol="0">
-            <a:spAutoFit/>
-          </a:bodyPr>
-          <a:lstStyle/>
-          <a:p>
-            <a:r>
-              <a:rPr kumimoji="1" lang="en-US" altLang="ja-JP" sz="1400" dirty="0" smtClean="0">
-                <a:solidFill>
-                  <a:schemeClr val="tx1">
-                    <a:lumMod val="50000"/>
-                    <a:lumOff val="50000"/>
-                  </a:schemeClr>
-                </a:solidFill>
-              </a:rPr>
-              <a:t>depends</a:t>
-            </a:r>
-            <a:endParaRPr kumimoji="1" lang="ja-JP" altLang="en-US" sz="1400" dirty="0">
-              <a:solidFill>
-                <a:schemeClr val="tx1">
-                  <a:lumMod val="50000"/>
-                  <a:lumOff val="50000"/>
-                </a:schemeClr>
-              </a:solidFill>
-            </a:endParaRPr>
-          </a:p>
-        </p:txBody>
-      </p:sp>
-      <p:sp>
-        <p:nvSpPr>
-          <p:cNvPr id="93" name="テキスト ボックス 92"/>
-          <p:cNvSpPr txBox="1"/>
-          <p:nvPr/>
-        </p:nvSpPr>
-        <p:spPr>
-          <a:xfrm>
-            <a:off x="99969" y="3449965"/>
-            <a:ext cx="810851" cy="307777"/>
-          </a:xfrm>
-          <a:prstGeom prst="rect">
-            <a:avLst/>
-          </a:prstGeom>
-          <a:noFill/>
-        </p:spPr>
-        <p:txBody>
-          <a:bodyPr wrap="none" rtlCol="0">
-            <a:spAutoFit/>
-          </a:bodyPr>
-          <a:lstStyle/>
-          <a:p>
-            <a:r>
-              <a:rPr kumimoji="1" lang="en-US" altLang="ja-JP" sz="1400" dirty="0" smtClean="0">
-                <a:solidFill>
-                  <a:schemeClr val="tx1">
-                    <a:lumMod val="50000"/>
-                    <a:lumOff val="50000"/>
-                  </a:schemeClr>
-                </a:solidFill>
-              </a:rPr>
-              <a:t>depends</a:t>
-            </a:r>
-            <a:endParaRPr kumimoji="1" lang="ja-JP" altLang="en-US" sz="1400" dirty="0">
-              <a:solidFill>
-                <a:schemeClr val="tx1">
-                  <a:lumMod val="50000"/>
-                  <a:lumOff val="50000"/>
-                </a:schemeClr>
-              </a:solidFill>
-            </a:endParaRPr>
-          </a:p>
-        </p:txBody>
-      </p:sp>
-      <p:sp>
-        <p:nvSpPr>
-          <p:cNvPr id="34" name="角丸四角形 33"/>
-          <p:cNvSpPr/>
-          <p:nvPr/>
-        </p:nvSpPr>
-        <p:spPr>
-          <a:xfrm>
-            <a:off x="368094" y="5080969"/>
-            <a:ext cx="3387338" cy="368242"/>
-          </a:xfrm>
-          <a:prstGeom prst="roundRect">
-            <a:avLst/>
-          </a:prstGeom>
-          <a:gradFill>
-            <a:gsLst>
-              <a:gs pos="0">
-                <a:schemeClr val="bg1">
-                  <a:lumMod val="75000"/>
-                </a:schemeClr>
-              </a:gs>
-              <a:gs pos="100000">
-                <a:schemeClr val="bg1">
-                  <a:lumMod val="95000"/>
-                </a:schemeClr>
-              </a:gs>
-            </a:gsLst>
-          </a:gradFill>
-        </p:spPr>
-        <p:style>
-          <a:lnRef idx="1">
-            <a:schemeClr val="dk1"/>
-          </a:lnRef>
-          <a:fillRef idx="3">
-            <a:schemeClr val="dk1"/>
-          </a:fillRef>
-          <a:effectRef idx="2">
-            <a:schemeClr val="dk1"/>
-          </a:effectRef>
-          <a:fontRef idx="minor">
-            <a:schemeClr val="lt1"/>
-          </a:fontRef>
-        </p:style>
-        <p:txBody>
-          <a:bodyPr rtlCol="0" anchor="ctr"/>
-          <a:lstStyle/>
-          <a:p>
-            <a:pPr algn="ctr"/>
-            <a:r>
-              <a:rPr lang="en-US" altLang="ja-JP" sz="1600" dirty="0" err="1" smtClean="0">
-                <a:solidFill>
-                  <a:schemeClr val="tx1">
-                    <a:lumMod val="75000"/>
-                    <a:lumOff val="25000"/>
-                  </a:schemeClr>
-                </a:solidFill>
-              </a:rPr>
-              <a:t>codepoints</a:t>
-            </a:r>
-            <a:endParaRPr kumimoji="1" lang="en-US" altLang="ja-JP" sz="1600" dirty="0" smtClean="0">
-              <a:solidFill>
-                <a:schemeClr val="tx1">
-                  <a:lumMod val="75000"/>
-                  <a:lumOff val="25000"/>
-                </a:schemeClr>
-              </a:solidFill>
-            </a:endParaRPr>
-          </a:p>
-        </p:txBody>
-      </p:sp>
-      <p:sp>
-        <p:nvSpPr>
-          <p:cNvPr id="35" name="角丸四角形 34"/>
-          <p:cNvSpPr/>
-          <p:nvPr/>
-        </p:nvSpPr>
-        <p:spPr>
-          <a:xfrm>
-            <a:off x="368094" y="4434484"/>
-            <a:ext cx="3387338" cy="368242"/>
-          </a:xfrm>
-          <a:prstGeom prst="roundRect">
-            <a:avLst/>
-          </a:prstGeom>
-          <a:gradFill>
-            <a:gsLst>
-              <a:gs pos="0">
-                <a:schemeClr val="bg1">
-                  <a:lumMod val="75000"/>
-                </a:schemeClr>
-              </a:gs>
-              <a:gs pos="100000">
-                <a:schemeClr val="bg1">
-                  <a:lumMod val="95000"/>
-                </a:schemeClr>
-              </a:gs>
-            </a:gsLst>
-          </a:gradFill>
-        </p:spPr>
-        <p:style>
-          <a:lnRef idx="1">
-            <a:schemeClr val="dk1"/>
-          </a:lnRef>
-          <a:fillRef idx="3">
-            <a:schemeClr val="dk1"/>
-          </a:fillRef>
-          <a:effectRef idx="2">
-            <a:schemeClr val="dk1"/>
-          </a:effectRef>
-          <a:fontRef idx="minor">
-            <a:schemeClr val="lt1"/>
-          </a:fontRef>
-        </p:style>
-        <p:txBody>
-          <a:bodyPr rtlCol="0" anchor="ctr"/>
-          <a:lstStyle/>
-          <a:p>
-            <a:pPr algn="ctr"/>
-            <a:r>
-              <a:rPr kumimoji="1" lang="en-US" altLang="ja-JP" sz="1600" dirty="0" smtClean="0">
-                <a:solidFill>
-                  <a:schemeClr val="tx1">
-                    <a:lumMod val="75000"/>
-                    <a:lumOff val="25000"/>
-                  </a:schemeClr>
-                </a:solidFill>
-              </a:rPr>
-              <a:t>string</a:t>
-            </a:r>
-          </a:p>
-        </p:txBody>
-      </p:sp>
-      <p:sp>
-        <p:nvSpPr>
-          <p:cNvPr id="36" name="角丸四角形 35"/>
-          <p:cNvSpPr/>
-          <p:nvPr/>
-        </p:nvSpPr>
-        <p:spPr>
-          <a:xfrm>
-            <a:off x="368094" y="5727454"/>
-            <a:ext cx="3387338" cy="368242"/>
-          </a:xfrm>
-          <a:prstGeom prst="roundRect">
-            <a:avLst/>
-          </a:prstGeom>
-          <a:gradFill>
-            <a:gsLst>
-              <a:gs pos="0">
-                <a:schemeClr val="bg1">
-                  <a:lumMod val="75000"/>
-                </a:schemeClr>
-              </a:gs>
-              <a:gs pos="100000">
-                <a:schemeClr val="bg1">
-                  <a:lumMod val="95000"/>
-                </a:schemeClr>
-              </a:gs>
-            </a:gsLst>
-          </a:gradFill>
-        </p:spPr>
-        <p:style>
-          <a:lnRef idx="1">
-            <a:schemeClr val="dk1"/>
-          </a:lnRef>
-          <a:fillRef idx="3">
-            <a:schemeClr val="dk1"/>
-          </a:fillRef>
-          <a:effectRef idx="2">
-            <a:schemeClr val="dk1"/>
-          </a:effectRef>
-          <a:fontRef idx="minor">
-            <a:schemeClr val="lt1"/>
-          </a:fontRef>
-        </p:style>
-        <p:txBody>
-          <a:bodyPr rtlCol="0" anchor="ctr"/>
-          <a:lstStyle/>
-          <a:p>
-            <a:pPr algn="ctr"/>
-            <a:r>
-              <a:rPr lang="en-US" altLang="ja-JP" sz="1600" dirty="0" smtClean="0">
-                <a:solidFill>
-                  <a:schemeClr val="tx1">
-                    <a:lumMod val="75000"/>
-                    <a:lumOff val="25000"/>
-                  </a:schemeClr>
-                </a:solidFill>
-              </a:rPr>
-              <a:t>validator</a:t>
-            </a:r>
-            <a:endParaRPr kumimoji="1" lang="en-US" altLang="ja-JP" sz="1600" dirty="0" smtClean="0">
-              <a:solidFill>
-                <a:schemeClr val="tx1">
-                  <a:lumMod val="75000"/>
-                  <a:lumOff val="25000"/>
-                </a:schemeClr>
-              </a:solidFill>
-            </a:endParaRPr>
-          </a:p>
-        </p:txBody>
-      </p:sp>
-      <p:sp>
-        <p:nvSpPr>
-          <p:cNvPr id="60" name="角丸四角形 59"/>
-          <p:cNvSpPr/>
-          <p:nvPr/>
-        </p:nvSpPr>
-        <p:spPr>
-          <a:xfrm>
-            <a:off x="387939" y="3094770"/>
-            <a:ext cx="3377415" cy="368242"/>
-          </a:xfrm>
-          <a:prstGeom prst="roundRect">
-            <a:avLst/>
-          </a:prstGeom>
-          <a:gradFill>
-            <a:gsLst>
-              <a:gs pos="0">
-                <a:schemeClr val="bg1">
-                  <a:lumMod val="75000"/>
-                </a:schemeClr>
-              </a:gs>
-              <a:gs pos="100000">
-                <a:schemeClr val="bg1">
-                  <a:lumMod val="95000"/>
-                </a:schemeClr>
-              </a:gs>
-            </a:gsLst>
-          </a:gradFill>
-        </p:spPr>
-        <p:style>
-          <a:lnRef idx="1">
-            <a:schemeClr val="dk1"/>
-          </a:lnRef>
-          <a:fillRef idx="3">
-            <a:schemeClr val="dk1"/>
-          </a:fillRef>
-          <a:effectRef idx="2">
-            <a:schemeClr val="dk1"/>
-          </a:effectRef>
-          <a:fontRef idx="minor">
-            <a:schemeClr val="lt1"/>
-          </a:fontRef>
-        </p:style>
-        <p:txBody>
-          <a:bodyPr rtlCol="0" anchor="ctr"/>
-          <a:lstStyle/>
-          <a:p>
-            <a:pPr algn="ctr"/>
-            <a:r>
-              <a:rPr kumimoji="1" lang="en-US" altLang="ja-JP" sz="1600" dirty="0" smtClean="0">
-                <a:solidFill>
-                  <a:schemeClr val="tx1">
-                    <a:lumMod val="75000"/>
-                    <a:lumOff val="25000"/>
-                  </a:schemeClr>
-                </a:solidFill>
-              </a:rPr>
-              <a:t>web</a:t>
-            </a:r>
-            <a:r>
-              <a:rPr lang="en-US" altLang="ja-JP" sz="1600" dirty="0" smtClean="0">
-                <a:solidFill>
-                  <a:schemeClr val="tx1">
-                    <a:lumMod val="75000"/>
-                    <a:lumOff val="25000"/>
-                  </a:schemeClr>
-                </a:solidFill>
-              </a:rPr>
-              <a:t>-</a:t>
-            </a:r>
-            <a:r>
-              <a:rPr lang="en-US" altLang="ja-JP" sz="1600" dirty="0" err="1" smtClean="0">
-                <a:solidFill>
-                  <a:schemeClr val="tx1">
-                    <a:lumMod val="75000"/>
-                    <a:lumOff val="25000"/>
-                  </a:schemeClr>
-                </a:solidFill>
-              </a:rPr>
-              <a:t>jsp</a:t>
-            </a:r>
-            <a:endParaRPr kumimoji="1" lang="en-US" altLang="ja-JP" sz="1600" dirty="0" smtClean="0">
-              <a:solidFill>
-                <a:schemeClr val="tx1">
-                  <a:lumMod val="75000"/>
-                  <a:lumOff val="25000"/>
-                </a:schemeClr>
-              </a:solidFill>
-            </a:endParaRPr>
-          </a:p>
-        </p:txBody>
-      </p:sp>
-      <p:sp>
-        <p:nvSpPr>
-          <p:cNvPr id="69" name="テキスト ボックス 68"/>
-          <p:cNvSpPr txBox="1"/>
-          <p:nvPr/>
-        </p:nvSpPr>
-        <p:spPr>
-          <a:xfrm>
-            <a:off x="7158523" y="1145849"/>
-            <a:ext cx="810851" cy="307777"/>
-          </a:xfrm>
-          <a:prstGeom prst="rect">
-            <a:avLst/>
-          </a:prstGeom>
-          <a:noFill/>
-        </p:spPr>
-        <p:txBody>
-          <a:bodyPr wrap="none" rtlCol="0">
-            <a:spAutoFit/>
-          </a:bodyPr>
-          <a:lstStyle/>
-          <a:p>
-            <a:r>
-              <a:rPr kumimoji="1" lang="en-US" altLang="ja-JP" sz="1400" dirty="0" smtClean="0">
-                <a:solidFill>
-                  <a:schemeClr val="tx1">
-                    <a:lumMod val="50000"/>
-                    <a:lumOff val="50000"/>
-                  </a:schemeClr>
-                </a:solidFill>
-              </a:rPr>
-              <a:t>depends</a:t>
-            </a:r>
-            <a:endParaRPr kumimoji="1" lang="ja-JP" altLang="en-US" sz="1400" dirty="0">
-              <a:solidFill>
-                <a:schemeClr val="tx1">
-                  <a:lumMod val="50000"/>
-                  <a:lumOff val="50000"/>
-                </a:schemeClr>
-              </a:solidFill>
-            </a:endParaRPr>
-          </a:p>
-        </p:txBody>
-      </p:sp>
-      <p:cxnSp>
-        <p:nvCxnSpPr>
-          <p:cNvPr id="21" name="カギ線コネクタ 20"/>
-          <p:cNvCxnSpPr>
-            <a:stCxn id="47" idx="1"/>
-            <a:endCxn id="53" idx="1"/>
-          </p:cNvCxnSpPr>
-          <p:nvPr/>
-        </p:nvCxnSpPr>
-        <p:spPr>
-          <a:xfrm rot="10800000">
-            <a:off x="387940" y="2632406"/>
-            <a:ext cx="3569" cy="1292970"/>
-          </a:xfrm>
-          <a:prstGeom prst="bentConnector3">
-            <a:avLst>
-              <a:gd name="adj1" fmla="val 6505156"/>
-            </a:avLst>
-          </a:prstGeom>
-          <a:ln w="12700" cmpd="sng">
-            <a:solidFill>
-              <a:schemeClr val="tx1">
-                <a:lumMod val="50000"/>
-                <a:lumOff val="50000"/>
-              </a:schemeClr>
-            </a:solidFill>
-            <a:prstDash val="sysDash"/>
-            <a:headEnd type="none"/>
-            <a:tailEnd type="triangle"/>
-          </a:ln>
-        </p:spPr>
-        <p:style>
-          <a:lnRef idx="2">
-            <a:schemeClr val="accent1"/>
-          </a:lnRef>
-          <a:fillRef idx="0">
-            <a:schemeClr val="accent1"/>
-          </a:fillRef>
-          <a:effectRef idx="1">
-            <a:schemeClr val="accent1"/>
-          </a:effectRef>
-          <a:fontRef idx="minor">
-            <a:schemeClr val="tx1"/>
-          </a:fontRef>
-        </p:style>
-      </p:cxnSp>
-      <p:sp>
-        <p:nvSpPr>
           <p:cNvPr id="62" name="角丸四角形 61"/>
           <p:cNvSpPr/>
           <p:nvPr/>
@@ -8383,7 +8295,7 @@
         </p:nvSpPr>
         <p:spPr>
           <a:xfrm>
-            <a:off x="5377732" y="1801859"/>
+            <a:off x="5377732" y="1155315"/>
             <a:ext cx="3363925" cy="368242"/>
           </a:xfrm>
           <a:prstGeom prst="roundRect">
@@ -8523,7 +8435,7 @@
         </p:nvSpPr>
         <p:spPr>
           <a:xfrm>
-            <a:off x="5367810" y="1154316"/>
+            <a:off x="5367810" y="1801800"/>
             <a:ext cx="3387338" cy="368242"/>
           </a:xfrm>
           <a:prstGeom prst="roundRect">
@@ -9126,7 +9038,7 @@
         </p:nvCxnSpPr>
         <p:spPr>
           <a:xfrm flipH="1">
-            <a:off x="3765355" y="1338437"/>
+            <a:off x="3765355" y="1985921"/>
             <a:ext cx="1602455" cy="999"/>
           </a:xfrm>
           <a:prstGeom prst="straightConnector1">
@@ -9170,7 +9082,7 @@
         </p:nvCxnSpPr>
         <p:spPr>
           <a:xfrm flipH="1" flipV="1">
-            <a:off x="3765354" y="1985921"/>
+            <a:off x="3765354" y="1339377"/>
             <a:ext cx="1612378" cy="59"/>
           </a:xfrm>
           <a:prstGeom prst="straightConnector1">
@@ -9343,7 +9255,7 @@
         </p:nvSpPr>
         <p:spPr>
           <a:xfrm>
-            <a:off x="4182751" y="1295073"/>
+            <a:off x="4182751" y="1942557"/>
             <a:ext cx="810851" cy="307777"/>
           </a:xfrm>
           <a:prstGeom prst="rect">
@@ -9387,7 +9299,7 @@
         </p:nvSpPr>
         <p:spPr>
           <a:xfrm>
-            <a:off x="4182751" y="1948732"/>
+            <a:off x="4182751" y="1302188"/>
             <a:ext cx="810851" cy="307777"/>
           </a:xfrm>
           <a:prstGeom prst="rect">
@@ -9557,14 +9469,17 @@
       </p:sp>
       <p:cxnSp>
         <p:nvCxnSpPr>
-          <p:cNvPr id="164" name="直線コネクタ 2"/>
-          <p:cNvCxnSpPr/>
+          <p:cNvPr id="165" name="直線コネクタ 2"/>
+          <p:cNvCxnSpPr>
+            <a:stCxn id="218" idx="0"/>
+            <a:endCxn id="215" idx="2"/>
+          </p:cNvCxnSpPr>
           <p:nvPr/>
         </p:nvCxnSpPr>
         <p:spPr>
-          <a:xfrm flipH="1">
-            <a:off x="7059094" y="1523557"/>
-            <a:ext cx="1" cy="278243"/>
+          <a:xfrm flipH="1" flipV="1">
+            <a:off x="7059695" y="1523557"/>
+            <a:ext cx="1784" cy="278243"/>
           </a:xfrm>
           <a:prstGeom prst="straightConnector1">
             <a:avLst/>
@@ -9596,19 +9511,65 @@
           </a:fontRef>
         </p:style>
       </p:cxnSp>
+      <p:sp>
+        <p:nvSpPr>
+          <p:cNvPr id="166" name="テキスト ボックス 165"/>
+          <p:cNvSpPr txBox="1"/>
+          <p:nvPr/>
+        </p:nvSpPr>
+        <p:spPr>
+          <a:xfrm>
+            <a:off x="7158315" y="1505662"/>
+            <a:ext cx="810851" cy="307777"/>
+          </a:xfrm>
+          <a:prstGeom prst="rect">
+            <a:avLst/>
+          </a:prstGeom>
+          <a:noFill/>
+        </p:spPr>
+        <p:txBody>
+          <a:bodyPr wrap="none" rtlCol="0">
+            <a:spAutoFit/>
+          </a:bodyPr>
+          <a:lstStyle/>
+          <a:p>
+            <a:r>
+              <a:rPr kumimoji="1" lang="en-US" altLang="ja-JP" sz="1400" dirty="0" smtClean="0">
+                <a:solidFill>
+                  <a:schemeClr val="tx1">
+                    <a:lumMod val="50000"/>
+                    <a:lumOff val="50000"/>
+                  </a:schemeClr>
+                </a:solidFill>
+              </a:rPr>
+              <a:t>depends</a:t>
+            </a:r>
+            <a:endParaRPr kumimoji="1" lang="ja-JP" altLang="en-US" sz="1400" dirty="0">
+              <a:solidFill>
+                <a:schemeClr val="tx1">
+                  <a:lumMod val="50000"/>
+                  <a:lumOff val="50000"/>
+                </a:schemeClr>
+              </a:solidFill>
+            </a:endParaRPr>
+          </a:p>
+        </p:txBody>
+      </p:sp>
       <p:cxnSp>
         <p:nvCxnSpPr>
-          <p:cNvPr id="165" name="直線コネクタ 2"/>
+          <p:cNvPr id="170" name="カギ線コネクタ 169"/>
           <p:cNvCxnSpPr/>
           <p:nvPr/>
         </p:nvCxnSpPr>
         <p:spPr>
           <a:xfrm flipH="1" flipV="1">
-            <a:off x="7059094" y="2170042"/>
-            <a:ext cx="4962" cy="278243"/>
-          </a:xfrm>
-          <a:prstGeom prst="straightConnector1">
-            <a:avLst/>
+            <a:off x="8741657" y="1291811"/>
+            <a:ext cx="4235" cy="1943891"/>
+          </a:xfrm>
+          <a:prstGeom prst="bentConnector3">
+            <a:avLst>
+              <a:gd name="adj1" fmla="val -6522432"/>
+            </a:avLst>
           </a:prstGeom>
           <a:ln w="12700" cmpd="sng">
             <a:solidFill>
@@ -9619,7 +9580,7 @@
             </a:solidFill>
             <a:prstDash val="sysDash"/>
             <a:headEnd type="none"/>
-            <a:tailEnd type="arrow"/>
+            <a:tailEnd type="triangle"/>
           </a:ln>
         </p:spPr>
         <p:style>
@@ -9639,13 +9600,13 @@
       </p:cxnSp>
       <p:sp>
         <p:nvSpPr>
-          <p:cNvPr id="166" name="テキスト ボックス 165"/>
+          <p:cNvPr id="171" name="テキスト ボックス 170"/>
           <p:cNvSpPr txBox="1"/>
           <p:nvPr/>
         </p:nvSpPr>
         <p:spPr>
           <a:xfrm>
-            <a:off x="7158315" y="1505662"/>
+            <a:off x="8180319" y="2838483"/>
             <a:ext cx="810851" cy="307777"/>
           </a:xfrm>
           <a:prstGeom prst="rect">
@@ -9681,67 +9642,20 @@
           </a:p>
         </p:txBody>
       </p:sp>
-      <p:sp>
-        <p:nvSpPr>
-          <p:cNvPr id="167" name="テキスト ボックス 166"/>
-          <p:cNvSpPr txBox="1"/>
-          <p:nvPr/>
-        </p:nvSpPr>
-        <p:spPr>
-          <a:xfrm>
-            <a:off x="7158523" y="2151984"/>
-            <a:ext cx="810851" cy="307777"/>
-          </a:xfrm>
-          <a:prstGeom prst="rect">
-            <a:avLst/>
-          </a:prstGeom>
-          <a:noFill/>
-        </p:spPr>
-        <p:txBody>
-          <a:bodyPr wrap="none" rtlCol="0">
-            <a:spAutoFit/>
-          </a:bodyPr>
-          <a:lstStyle/>
-          <a:p>
-            <a:r>
-              <a:rPr kumimoji="1" lang="en-US" altLang="ja-JP" sz="1400" dirty="0" smtClean="0">
-                <a:solidFill>
-                  <a:schemeClr val="tx1">
-                    <a:lumMod val="50000"/>
-                    <a:lumOff val="50000"/>
-                  </a:schemeClr>
-                </a:solidFill>
-              </a:rPr>
-              <a:t>depends</a:t>
-            </a:r>
-            <a:endParaRPr kumimoji="1" lang="ja-JP" altLang="en-US" sz="1400" dirty="0">
-              <a:solidFill>
-                <a:schemeClr val="tx1">
-                  <a:lumMod val="50000"/>
-                  <a:lumOff val="50000"/>
-                </a:schemeClr>
-              </a:solidFill>
-            </a:endParaRPr>
-          </a:p>
-        </p:txBody>
-      </p:sp>
       <p:cxnSp>
         <p:nvCxnSpPr>
-          <p:cNvPr id="170" name="カギ線コネクタ 169"/>
-          <p:cNvCxnSpPr>
-            <a:stCxn id="68" idx="3"/>
-            <a:endCxn id="215" idx="3"/>
-          </p:cNvCxnSpPr>
+          <p:cNvPr id="66" name="カギ線コネクタ 65"/>
+          <p:cNvCxnSpPr/>
           <p:nvPr/>
         </p:nvCxnSpPr>
         <p:spPr>
-          <a:xfrm flipH="1" flipV="1">
-            <a:off x="8741657" y="1985980"/>
-            <a:ext cx="4235" cy="1297347"/>
+          <a:xfrm rot="10800000">
+            <a:off x="391510" y="1278263"/>
+            <a:ext cx="3569" cy="1292970"/>
           </a:xfrm>
           <a:prstGeom prst="bentConnector3">
             <a:avLst>
-              <a:gd name="adj1" fmla="val -5397875"/>
+              <a:gd name="adj1" fmla="val 6505156"/>
             </a:avLst>
           </a:prstGeom>
           <a:ln w="12700" cmpd="sng">
@@ -9773,13 +9687,100 @@
       </p:cxnSp>
       <p:sp>
         <p:nvSpPr>
-          <p:cNvPr id="171" name="テキスト ボックス 170"/>
+          <p:cNvPr id="67" name="テキスト ボックス 66"/>
           <p:cNvSpPr txBox="1"/>
           <p:nvPr/>
         </p:nvSpPr>
         <p:spPr>
           <a:xfrm>
-            <a:off x="8162655" y="2838483"/>
+            <a:off x="99969" y="2171041"/>
+            <a:ext cx="810851" cy="307777"/>
+          </a:xfrm>
+          <a:prstGeom prst="rect">
+            <a:avLst/>
+          </a:prstGeom>
+          <a:noFill/>
+        </p:spPr>
+        <p:txBody>
+          <a:bodyPr wrap="none" rtlCol="0">
+            <a:spAutoFit/>
+          </a:bodyPr>
+          <a:lstStyle/>
+          <a:p>
+            <a:r>
+              <a:rPr kumimoji="1" lang="en-US" altLang="ja-JP" sz="1400" dirty="0" smtClean="0">
+                <a:solidFill>
+                  <a:schemeClr val="tx1">
+                    <a:lumMod val="50000"/>
+                    <a:lumOff val="50000"/>
+                  </a:schemeClr>
+                </a:solidFill>
+              </a:rPr>
+              <a:t>depends</a:t>
+            </a:r>
+            <a:endParaRPr kumimoji="1" lang="ja-JP" altLang="en-US" sz="1400" dirty="0">
+              <a:solidFill>
+                <a:schemeClr val="tx1">
+                  <a:lumMod val="50000"/>
+                  <a:lumOff val="50000"/>
+                </a:schemeClr>
+              </a:solidFill>
+            </a:endParaRPr>
+          </a:p>
+        </p:txBody>
+      </p:sp>
+      <p:cxnSp>
+        <p:nvCxnSpPr>
+          <p:cNvPr id="77" name="カギ線コネクタ 76"/>
+          <p:cNvCxnSpPr/>
+          <p:nvPr/>
+        </p:nvCxnSpPr>
+        <p:spPr>
+          <a:xfrm flipV="1">
+            <a:off x="8742564" y="1392533"/>
+            <a:ext cx="13491" cy="1292967"/>
+          </a:xfrm>
+          <a:prstGeom prst="bentConnector3">
+            <a:avLst>
+              <a:gd name="adj1" fmla="val 1370847"/>
+            </a:avLst>
+          </a:prstGeom>
+          <a:ln w="12700" cmpd="sng">
+            <a:solidFill>
+              <a:schemeClr val="tx1">
+                <a:lumMod val="50000"/>
+                <a:lumOff val="50000"/>
+              </a:schemeClr>
+            </a:solidFill>
+            <a:prstDash val="sysDash"/>
+            <a:headEnd type="none"/>
+            <a:tailEnd type="triangle"/>
+          </a:ln>
+        </p:spPr>
+        <p:style>
+          <a:lnRef idx="2">
+            <a:schemeClr val="accent1"/>
+          </a:lnRef>
+          <a:fillRef idx="0">
+            <a:schemeClr val="accent1"/>
+          </a:fillRef>
+          <a:effectRef idx="1">
+            <a:schemeClr val="accent1"/>
+          </a:effectRef>
+          <a:fontRef idx="minor">
+            <a:schemeClr val="tx1"/>
+          </a:fontRef>
+        </p:style>
+      </p:cxnSp>
+      <p:sp>
+        <p:nvSpPr>
+          <p:cNvPr id="87" name="テキスト ボックス 86"/>
+          <p:cNvSpPr txBox="1"/>
+          <p:nvPr/>
+        </p:nvSpPr>
+        <p:spPr>
+          <a:xfrm>
+            <a:off x="8180319" y="2183576"/>
             <a:ext cx="810851" cy="307777"/>
           </a:xfrm>
           <a:prstGeom prst="rect">

</xml_diff>